<commit_message>
ajout d'un thème en plus du diapo
</commit_message>
<xml_diff>
--- a/Fera_Présentation/Diaporama Fera.pptx
+++ b/Fera_Présentation/Diaporama Fera.pptx
@@ -5,7 +5,7 @@
     <p:sldMasterId id="2147483648" r:id="rId1"/>
   </p:sldMasterIdLst>
   <p:notesMasterIdLst>
-    <p:notesMasterId r:id="rId25"/>
+    <p:notesMasterId r:id="rId28"/>
   </p:notesMasterIdLst>
   <p:sldIdLst>
     <p:sldId id="256" r:id="rId2"/>
@@ -30,7 +30,10 @@
     <p:sldId id="276" r:id="rId21"/>
     <p:sldId id="277" r:id="rId22"/>
     <p:sldId id="278" r:id="rId23"/>
-    <p:sldId id="262" r:id="rId24"/>
+    <p:sldId id="279" r:id="rId24"/>
+    <p:sldId id="280" r:id="rId25"/>
+    <p:sldId id="281" r:id="rId26"/>
+    <p:sldId id="262" r:id="rId27"/>
   </p:sldIdLst>
   <p:sldSz cx="12192000" cy="6858000"/>
   <p:notesSz cx="6858000" cy="9144000"/>
@@ -993,6 +996,330 @@
     <p:extLst>
       <p:ext uri="{BB962C8B-B14F-4D97-AF65-F5344CB8AC3E}">
         <p14:creationId xmlns:p14="http://schemas.microsoft.com/office/powerpoint/2010/main" val="3168881322"/>
+      </p:ext>
+    </p:extLst>
+  </p:cSld>
+  <p:clrMapOvr>
+    <a:masterClrMapping/>
+  </p:clrMapOvr>
+</p:notes>
+</file>
+
+<file path=ppt/notesSlides/notesSlide6.xml><?xml version="1.0" encoding="utf-8"?>
+<p:notes xmlns:a="http://schemas.openxmlformats.org/drawingml/2006/main" xmlns:r="http://schemas.openxmlformats.org/officeDocument/2006/relationships" xmlns:p="http://schemas.openxmlformats.org/presentationml/2006/main">
+  <p:cSld>
+    <p:spTree>
+      <p:nvGrpSpPr>
+        <p:cNvPr id="1" name="">
+          <a:extLst>
+            <a:ext uri="{FF2B5EF4-FFF2-40B4-BE49-F238E27FC236}">
+              <a16:creationId xmlns:a16="http://schemas.microsoft.com/office/drawing/2014/main" id="{7630B7DE-4952-6157-9821-CEE00CB18DED}"/>
+            </a:ext>
+          </a:extLst>
+        </p:cNvPr>
+        <p:cNvGrpSpPr/>
+        <p:nvPr/>
+      </p:nvGrpSpPr>
+      <p:grpSpPr>
+        <a:xfrm>
+          <a:off x="0" y="0"/>
+          <a:ext cx="0" cy="0"/>
+          <a:chOff x="0" y="0"/>
+          <a:chExt cx="0" cy="0"/>
+        </a:xfrm>
+      </p:grpSpPr>
+      <p:sp>
+        <p:nvSpPr>
+          <p:cNvPr id="2" name="Espace réservé de l'image des diapositives 1">
+            <a:extLst>
+              <a:ext uri="{FF2B5EF4-FFF2-40B4-BE49-F238E27FC236}">
+                <a16:creationId xmlns:a16="http://schemas.microsoft.com/office/drawing/2014/main" id="{1A3D3116-E656-56D0-DB76-86083E19AFA3}"/>
+              </a:ext>
+            </a:extLst>
+          </p:cNvPr>
+          <p:cNvSpPr>
+            <a:spLocks noGrp="1" noRot="1" noChangeAspect="1"/>
+          </p:cNvSpPr>
+          <p:nvPr>
+            <p:ph type="sldImg"/>
+          </p:nvPr>
+        </p:nvSpPr>
+        <p:spPr/>
+      </p:sp>
+      <p:sp>
+        <p:nvSpPr>
+          <p:cNvPr id="3" name="Espace réservé des notes 2">
+            <a:extLst>
+              <a:ext uri="{FF2B5EF4-FFF2-40B4-BE49-F238E27FC236}">
+                <a16:creationId xmlns:a16="http://schemas.microsoft.com/office/drawing/2014/main" id="{42262C5E-B0B8-EE2C-983A-3F3A37B75FBF}"/>
+              </a:ext>
+            </a:extLst>
+          </p:cNvPr>
+          <p:cNvSpPr>
+            <a:spLocks noGrp="1"/>
+          </p:cNvSpPr>
+          <p:nvPr>
+            <p:ph type="body" idx="1"/>
+          </p:nvPr>
+        </p:nvSpPr>
+        <p:spPr/>
+        <p:txBody>
+          <a:bodyPr/>
+          <a:lstStyle/>
+          <a:p>
+            <a:endParaRPr lang="fr-FR" dirty="0"/>
+          </a:p>
+        </p:txBody>
+      </p:sp>
+      <p:sp>
+        <p:nvSpPr>
+          <p:cNvPr id="4" name="Espace réservé du numéro de diapositive 3">
+            <a:extLst>
+              <a:ext uri="{FF2B5EF4-FFF2-40B4-BE49-F238E27FC236}">
+                <a16:creationId xmlns:a16="http://schemas.microsoft.com/office/drawing/2014/main" id="{3DA2A7F9-D484-C497-F5A3-ED02798B63F8}"/>
+              </a:ext>
+            </a:extLst>
+          </p:cNvPr>
+          <p:cNvSpPr>
+            <a:spLocks noGrp="1"/>
+          </p:cNvSpPr>
+          <p:nvPr>
+            <p:ph type="sldNum" sz="quarter" idx="5"/>
+          </p:nvPr>
+        </p:nvSpPr>
+        <p:spPr/>
+        <p:txBody>
+          <a:bodyPr/>
+          <a:lstStyle/>
+          <a:p>
+            <a:fld id="{CFE61EF1-D225-48D2-A6F1-B944C75F6B77}" type="slidenum">
+              <a:rPr lang="fr-FR" smtClean="0"/>
+              <a:t>23</a:t>
+            </a:fld>
+            <a:endParaRPr lang="fr-FR"/>
+          </a:p>
+        </p:txBody>
+      </p:sp>
+    </p:spTree>
+    <p:extLst>
+      <p:ext uri="{BB962C8B-B14F-4D97-AF65-F5344CB8AC3E}">
+        <p14:creationId xmlns:p14="http://schemas.microsoft.com/office/powerpoint/2010/main" val="1806954813"/>
+      </p:ext>
+    </p:extLst>
+  </p:cSld>
+  <p:clrMapOvr>
+    <a:masterClrMapping/>
+  </p:clrMapOvr>
+</p:notes>
+</file>
+
+<file path=ppt/notesSlides/notesSlide7.xml><?xml version="1.0" encoding="utf-8"?>
+<p:notes xmlns:a="http://schemas.openxmlformats.org/drawingml/2006/main" xmlns:r="http://schemas.openxmlformats.org/officeDocument/2006/relationships" xmlns:p="http://schemas.openxmlformats.org/presentationml/2006/main">
+  <p:cSld>
+    <p:spTree>
+      <p:nvGrpSpPr>
+        <p:cNvPr id="1" name="">
+          <a:extLst>
+            <a:ext uri="{FF2B5EF4-FFF2-40B4-BE49-F238E27FC236}">
+              <a16:creationId xmlns:a16="http://schemas.microsoft.com/office/drawing/2014/main" id="{15FB1C26-C7C4-B0A0-8906-5F5426FA0FA9}"/>
+            </a:ext>
+          </a:extLst>
+        </p:cNvPr>
+        <p:cNvGrpSpPr/>
+        <p:nvPr/>
+      </p:nvGrpSpPr>
+      <p:grpSpPr>
+        <a:xfrm>
+          <a:off x="0" y="0"/>
+          <a:ext cx="0" cy="0"/>
+          <a:chOff x="0" y="0"/>
+          <a:chExt cx="0" cy="0"/>
+        </a:xfrm>
+      </p:grpSpPr>
+      <p:sp>
+        <p:nvSpPr>
+          <p:cNvPr id="2" name="Espace réservé de l'image des diapositives 1">
+            <a:extLst>
+              <a:ext uri="{FF2B5EF4-FFF2-40B4-BE49-F238E27FC236}">
+                <a16:creationId xmlns:a16="http://schemas.microsoft.com/office/drawing/2014/main" id="{D44634DC-0C16-350B-2CC4-B6FEB8984024}"/>
+              </a:ext>
+            </a:extLst>
+          </p:cNvPr>
+          <p:cNvSpPr>
+            <a:spLocks noGrp="1" noRot="1" noChangeAspect="1"/>
+          </p:cNvSpPr>
+          <p:nvPr>
+            <p:ph type="sldImg"/>
+          </p:nvPr>
+        </p:nvSpPr>
+        <p:spPr/>
+      </p:sp>
+      <p:sp>
+        <p:nvSpPr>
+          <p:cNvPr id="3" name="Espace réservé des notes 2">
+            <a:extLst>
+              <a:ext uri="{FF2B5EF4-FFF2-40B4-BE49-F238E27FC236}">
+                <a16:creationId xmlns:a16="http://schemas.microsoft.com/office/drawing/2014/main" id="{EAEB1675-7F69-CE3F-3A93-066360F80DEA}"/>
+              </a:ext>
+            </a:extLst>
+          </p:cNvPr>
+          <p:cNvSpPr>
+            <a:spLocks noGrp="1"/>
+          </p:cNvSpPr>
+          <p:nvPr>
+            <p:ph type="body" idx="1"/>
+          </p:nvPr>
+        </p:nvSpPr>
+        <p:spPr/>
+        <p:txBody>
+          <a:bodyPr/>
+          <a:lstStyle/>
+          <a:p>
+            <a:endParaRPr lang="fr-FR" dirty="0"/>
+          </a:p>
+        </p:txBody>
+      </p:sp>
+      <p:sp>
+        <p:nvSpPr>
+          <p:cNvPr id="4" name="Espace réservé du numéro de diapositive 3">
+            <a:extLst>
+              <a:ext uri="{FF2B5EF4-FFF2-40B4-BE49-F238E27FC236}">
+                <a16:creationId xmlns:a16="http://schemas.microsoft.com/office/drawing/2014/main" id="{B2687893-F688-7432-B4A1-5B30B066B635}"/>
+              </a:ext>
+            </a:extLst>
+          </p:cNvPr>
+          <p:cNvSpPr>
+            <a:spLocks noGrp="1"/>
+          </p:cNvSpPr>
+          <p:nvPr>
+            <p:ph type="sldNum" sz="quarter" idx="5"/>
+          </p:nvPr>
+        </p:nvSpPr>
+        <p:spPr/>
+        <p:txBody>
+          <a:bodyPr/>
+          <a:lstStyle/>
+          <a:p>
+            <a:fld id="{CFE61EF1-D225-48D2-A6F1-B944C75F6B77}" type="slidenum">
+              <a:rPr lang="fr-FR" smtClean="0"/>
+              <a:t>24</a:t>
+            </a:fld>
+            <a:endParaRPr lang="fr-FR"/>
+          </a:p>
+        </p:txBody>
+      </p:sp>
+    </p:spTree>
+    <p:extLst>
+      <p:ext uri="{BB962C8B-B14F-4D97-AF65-F5344CB8AC3E}">
+        <p14:creationId xmlns:p14="http://schemas.microsoft.com/office/powerpoint/2010/main" val="4284022620"/>
+      </p:ext>
+    </p:extLst>
+  </p:cSld>
+  <p:clrMapOvr>
+    <a:masterClrMapping/>
+  </p:clrMapOvr>
+</p:notes>
+</file>
+
+<file path=ppt/notesSlides/notesSlide8.xml><?xml version="1.0" encoding="utf-8"?>
+<p:notes xmlns:a="http://schemas.openxmlformats.org/drawingml/2006/main" xmlns:r="http://schemas.openxmlformats.org/officeDocument/2006/relationships" xmlns:p="http://schemas.openxmlformats.org/presentationml/2006/main">
+  <p:cSld>
+    <p:spTree>
+      <p:nvGrpSpPr>
+        <p:cNvPr id="1" name="">
+          <a:extLst>
+            <a:ext uri="{FF2B5EF4-FFF2-40B4-BE49-F238E27FC236}">
+              <a16:creationId xmlns:a16="http://schemas.microsoft.com/office/drawing/2014/main" id="{D90DF093-5B7C-FF61-4D3E-8B6416007FA7}"/>
+            </a:ext>
+          </a:extLst>
+        </p:cNvPr>
+        <p:cNvGrpSpPr/>
+        <p:nvPr/>
+      </p:nvGrpSpPr>
+      <p:grpSpPr>
+        <a:xfrm>
+          <a:off x="0" y="0"/>
+          <a:ext cx="0" cy="0"/>
+          <a:chOff x="0" y="0"/>
+          <a:chExt cx="0" cy="0"/>
+        </a:xfrm>
+      </p:grpSpPr>
+      <p:sp>
+        <p:nvSpPr>
+          <p:cNvPr id="2" name="Espace réservé de l'image des diapositives 1">
+            <a:extLst>
+              <a:ext uri="{FF2B5EF4-FFF2-40B4-BE49-F238E27FC236}">
+                <a16:creationId xmlns:a16="http://schemas.microsoft.com/office/drawing/2014/main" id="{68B9E5B2-9975-B4A1-320F-90312EF06FFE}"/>
+              </a:ext>
+            </a:extLst>
+          </p:cNvPr>
+          <p:cNvSpPr>
+            <a:spLocks noGrp="1" noRot="1" noChangeAspect="1"/>
+          </p:cNvSpPr>
+          <p:nvPr>
+            <p:ph type="sldImg"/>
+          </p:nvPr>
+        </p:nvSpPr>
+        <p:spPr/>
+      </p:sp>
+      <p:sp>
+        <p:nvSpPr>
+          <p:cNvPr id="3" name="Espace réservé des notes 2">
+            <a:extLst>
+              <a:ext uri="{FF2B5EF4-FFF2-40B4-BE49-F238E27FC236}">
+                <a16:creationId xmlns:a16="http://schemas.microsoft.com/office/drawing/2014/main" id="{CC7E20CB-0E4D-1000-F07D-363F60E7416E}"/>
+              </a:ext>
+            </a:extLst>
+          </p:cNvPr>
+          <p:cNvSpPr>
+            <a:spLocks noGrp="1"/>
+          </p:cNvSpPr>
+          <p:nvPr>
+            <p:ph type="body" idx="1"/>
+          </p:nvPr>
+        </p:nvSpPr>
+        <p:spPr/>
+        <p:txBody>
+          <a:bodyPr/>
+          <a:lstStyle/>
+          <a:p>
+            <a:endParaRPr lang="fr-FR" dirty="0"/>
+          </a:p>
+        </p:txBody>
+      </p:sp>
+      <p:sp>
+        <p:nvSpPr>
+          <p:cNvPr id="4" name="Espace réservé du numéro de diapositive 3">
+            <a:extLst>
+              <a:ext uri="{FF2B5EF4-FFF2-40B4-BE49-F238E27FC236}">
+                <a16:creationId xmlns:a16="http://schemas.microsoft.com/office/drawing/2014/main" id="{9729E6EF-D378-E43A-499B-5F656911FB64}"/>
+              </a:ext>
+            </a:extLst>
+          </p:cNvPr>
+          <p:cNvSpPr>
+            <a:spLocks noGrp="1"/>
+          </p:cNvSpPr>
+          <p:nvPr>
+            <p:ph type="sldNum" sz="quarter" idx="5"/>
+          </p:nvPr>
+        </p:nvSpPr>
+        <p:spPr/>
+        <p:txBody>
+          <a:bodyPr/>
+          <a:lstStyle/>
+          <a:p>
+            <a:fld id="{CFE61EF1-D225-48D2-A6F1-B944C75F6B77}" type="slidenum">
+              <a:rPr lang="fr-FR" smtClean="0"/>
+              <a:t>25</a:t>
+            </a:fld>
+            <a:endParaRPr lang="fr-FR"/>
+          </a:p>
+        </p:txBody>
+      </p:sp>
+    </p:spTree>
+    <p:extLst>
+      <p:ext uri="{BB962C8B-B14F-4D97-AF65-F5344CB8AC3E}">
+        <p14:creationId xmlns:p14="http://schemas.microsoft.com/office/powerpoint/2010/main" val="2955929265"/>
       </p:ext>
     </p:extLst>
   </p:cSld>
@@ -7343,13 +7670,13 @@
   <p:clrMapOvr>
     <a:masterClrMapping/>
   </p:clrMapOvr>
-  <mc:AlternateContent xmlns:mc="http://schemas.openxmlformats.org/markup-compatibility/2006">
-    <mc:Choice xmlns:p159="http://schemas.microsoft.com/office/powerpoint/2015/09/main" Requires="p159">
+  <mc:AlternateContent xmlns:mc="http://schemas.openxmlformats.org/markup-compatibility/2006" xmlns:p159="http://schemas.microsoft.com/office/powerpoint/2015/09/main">
+    <mc:Choice Requires="p159">
       <p:transition xmlns:p14="http://schemas.microsoft.com/office/powerpoint/2010/main" spd="slow" p14:dur="2000">
         <p159:morph option="byObject"/>
       </p:transition>
     </mc:Choice>
-    <mc:Fallback>
+    <mc:Fallback xmlns="">
       <p:transition spd="slow">
         <p:fade/>
       </p:transition>
@@ -7898,13 +8225,13 @@
   <p:clrMapOvr>
     <a:masterClrMapping/>
   </p:clrMapOvr>
-  <mc:AlternateContent xmlns:mc="http://schemas.openxmlformats.org/markup-compatibility/2006">
-    <mc:Choice xmlns:p159="http://schemas.microsoft.com/office/powerpoint/2015/09/main" Requires="p159">
+  <mc:AlternateContent xmlns:mc="http://schemas.openxmlformats.org/markup-compatibility/2006" xmlns:p159="http://schemas.microsoft.com/office/powerpoint/2015/09/main">
+    <mc:Choice Requires="p159">
       <p:transition xmlns:p14="http://schemas.microsoft.com/office/powerpoint/2010/main" spd="slow" p14:dur="2000">
         <p159:morph option="byObject"/>
       </p:transition>
     </mc:Choice>
-    <mc:Fallback>
+    <mc:Fallback xmlns="">
       <p:transition spd="slow">
         <p:fade/>
       </p:transition>
@@ -9919,13 +10246,13 @@
   <p:clrMapOvr>
     <a:masterClrMapping/>
   </p:clrMapOvr>
-  <mc:AlternateContent xmlns:mc="http://schemas.openxmlformats.org/markup-compatibility/2006">
-    <mc:Choice xmlns:p159="http://schemas.microsoft.com/office/powerpoint/2015/09/main" Requires="p159">
+  <mc:AlternateContent xmlns:mc="http://schemas.openxmlformats.org/markup-compatibility/2006" xmlns:p159="http://schemas.microsoft.com/office/powerpoint/2015/09/main">
+    <mc:Choice Requires="p159">
       <p:transition xmlns:p14="http://schemas.microsoft.com/office/powerpoint/2010/main" spd="slow" p14:dur="2000">
         <p159:morph option="byObject"/>
       </p:transition>
     </mc:Choice>
-    <mc:Fallback>
+    <mc:Fallback xmlns="">
       <p:transition spd="slow">
         <p:fade/>
       </p:transition>
@@ -10886,13 +11213,13 @@
   <p:clrMapOvr>
     <a:masterClrMapping/>
   </p:clrMapOvr>
-  <mc:AlternateContent xmlns:mc="http://schemas.openxmlformats.org/markup-compatibility/2006">
-    <mc:Choice xmlns:p159="http://schemas.microsoft.com/office/powerpoint/2015/09/main" Requires="p159">
+  <mc:AlternateContent xmlns:mc="http://schemas.openxmlformats.org/markup-compatibility/2006" xmlns:p159="http://schemas.microsoft.com/office/powerpoint/2015/09/main">
+    <mc:Choice Requires="p159">
       <p:transition spd="slow">
         <p159:morph option="byObject"/>
       </p:transition>
     </mc:Choice>
-    <mc:Fallback>
+    <mc:Fallback xmlns="">
       <p:transition spd="slow">
         <p:fade/>
       </p:transition>
@@ -11853,13 +12180,13 @@
   <p:clrMapOvr>
     <a:masterClrMapping/>
   </p:clrMapOvr>
-  <mc:AlternateContent xmlns:mc="http://schemas.openxmlformats.org/markup-compatibility/2006">
-    <mc:Choice xmlns:p159="http://schemas.microsoft.com/office/powerpoint/2015/09/main" Requires="p159">
+  <mc:AlternateContent xmlns:mc="http://schemas.openxmlformats.org/markup-compatibility/2006" xmlns:p159="http://schemas.microsoft.com/office/powerpoint/2015/09/main">
+    <mc:Choice Requires="p159">
       <p:transition>
         <p159:morph option="byObject"/>
       </p:transition>
     </mc:Choice>
-    <mc:Fallback>
+    <mc:Fallback xmlns="">
       <p:transition>
         <p:fade/>
       </p:transition>
@@ -12839,13 +13166,13 @@
   <p:clrMapOvr>
     <a:masterClrMapping/>
   </p:clrMapOvr>
-  <mc:AlternateContent xmlns:mc="http://schemas.openxmlformats.org/markup-compatibility/2006">
-    <mc:Choice xmlns:p159="http://schemas.microsoft.com/office/powerpoint/2015/09/main" Requires="p159">
+  <mc:AlternateContent xmlns:mc="http://schemas.openxmlformats.org/markup-compatibility/2006" xmlns:p159="http://schemas.microsoft.com/office/powerpoint/2015/09/main">
+    <mc:Choice Requires="p159">
       <p:transition>
         <p159:morph option="byObject"/>
       </p:transition>
     </mc:Choice>
-    <mc:Fallback>
+    <mc:Fallback xmlns="">
       <p:transition>
         <p:fade/>
       </p:transition>
@@ -13411,13 +13738,13 @@
   <p:clrMapOvr>
     <a:masterClrMapping/>
   </p:clrMapOvr>
-  <mc:AlternateContent xmlns:mc="http://schemas.openxmlformats.org/markup-compatibility/2006">
-    <mc:Choice xmlns:p159="http://schemas.microsoft.com/office/powerpoint/2015/09/main" Requires="p159">
+  <mc:AlternateContent xmlns:mc="http://schemas.openxmlformats.org/markup-compatibility/2006" xmlns:p159="http://schemas.microsoft.com/office/powerpoint/2015/09/main">
+    <mc:Choice Requires="p159">
       <p:transition>
         <p159:morph option="byObject"/>
       </p:transition>
     </mc:Choice>
-    <mc:Fallback>
+    <mc:Fallback xmlns="">
       <p:transition>
         <p:fade/>
       </p:transition>
@@ -14486,13 +14813,13 @@
   <p:clrMapOvr>
     <a:masterClrMapping/>
   </p:clrMapOvr>
-  <mc:AlternateContent xmlns:mc="http://schemas.openxmlformats.org/markup-compatibility/2006">
-    <mc:Choice xmlns:p159="http://schemas.microsoft.com/office/powerpoint/2015/09/main" Requires="p159">
+  <mc:AlternateContent xmlns:mc="http://schemas.openxmlformats.org/markup-compatibility/2006" xmlns:p159="http://schemas.microsoft.com/office/powerpoint/2015/09/main">
+    <mc:Choice Requires="p159">
       <p:transition xmlns:p14="http://schemas.microsoft.com/office/powerpoint/2010/main" p14:dur="250">
         <p159:morph option="byObject"/>
       </p:transition>
     </mc:Choice>
-    <mc:Fallback>
+    <mc:Fallback xmlns="">
       <p:transition>
         <p:fade/>
       </p:transition>
@@ -15783,13 +16110,13 @@
   <p:clrMapOvr>
     <a:masterClrMapping/>
   </p:clrMapOvr>
-  <mc:AlternateContent xmlns:mc="http://schemas.openxmlformats.org/markup-compatibility/2006">
-    <mc:Choice xmlns:p159="http://schemas.microsoft.com/office/powerpoint/2015/09/main" Requires="p159">
+  <mc:AlternateContent xmlns:mc="http://schemas.openxmlformats.org/markup-compatibility/2006" xmlns:p159="http://schemas.microsoft.com/office/powerpoint/2015/09/main">
+    <mc:Choice Requires="p159">
       <p:transition xmlns:p14="http://schemas.microsoft.com/office/powerpoint/2010/main" spd="slow" p14:dur="2000">
         <p159:morph option="byObject"/>
       </p:transition>
     </mc:Choice>
-    <mc:Fallback>
+    <mc:Fallback xmlns="">
       <p:transition spd="slow">
         <p:fade/>
       </p:transition>
@@ -16399,13 +16726,13 @@
   <p:clrMapOvr>
     <a:masterClrMapping/>
   </p:clrMapOvr>
-  <mc:AlternateContent xmlns:mc="http://schemas.openxmlformats.org/markup-compatibility/2006">
-    <mc:Choice xmlns:p159="http://schemas.microsoft.com/office/powerpoint/2015/09/main" Requires="p159">
+  <mc:AlternateContent xmlns:mc="http://schemas.openxmlformats.org/markup-compatibility/2006" xmlns:p159="http://schemas.microsoft.com/office/powerpoint/2015/09/main">
+    <mc:Choice Requires="p159">
       <p:transition xmlns:p14="http://schemas.microsoft.com/office/powerpoint/2010/main" spd="slow" p14:dur="2000">
         <p159:morph option="byObject"/>
       </p:transition>
     </mc:Choice>
-    <mc:Fallback>
+    <mc:Fallback xmlns="">
       <p:transition spd="slow">
         <p:fade/>
       </p:transition>
@@ -17005,10 +17332,796 @@
           </a:prstGeom>
         </p:spPr>
       </p:pic>
+      <p:sp>
+        <p:nvSpPr>
+          <p:cNvPr id="2" name="ZoneTexte 1">
+            <a:extLst>
+              <a:ext uri="{FF2B5EF4-FFF2-40B4-BE49-F238E27FC236}">
+                <a16:creationId xmlns:a16="http://schemas.microsoft.com/office/drawing/2014/main" id="{381B0830-95C2-4EC9-C1DB-D258198F838A}"/>
+              </a:ext>
+            </a:extLst>
+          </p:cNvPr>
+          <p:cNvSpPr txBox="1"/>
+          <p:nvPr/>
+        </p:nvSpPr>
+        <p:spPr>
+          <a:xfrm>
+            <a:off x="2945936" y="-915667"/>
+            <a:ext cx="6300123" cy="769441"/>
+          </a:xfrm>
+          <a:prstGeom prst="rect">
+            <a:avLst/>
+          </a:prstGeom>
+          <a:noFill/>
+        </p:spPr>
+        <p:txBody>
+          <a:bodyPr wrap="none" rtlCol="0">
+            <a:spAutoFit/>
+          </a:bodyPr>
+          <a:lstStyle/>
+          <a:p>
+            <a:r>
+              <a:rPr lang="fr-FR" sz="4400" dirty="0">
+                <a:latin typeface="Algerian" panose="04020705040A02060702" pitchFamily="82" charset="0"/>
+              </a:rPr>
+              <a:t>Les différents rôles</a:t>
+            </a:r>
+          </a:p>
+        </p:txBody>
+      </p:sp>
     </p:spTree>
     <p:extLst>
       <p:ext uri="{BB962C8B-B14F-4D97-AF65-F5344CB8AC3E}">
         <p14:creationId xmlns:p14="http://schemas.microsoft.com/office/powerpoint/2010/main" val="3830369917"/>
+      </p:ext>
+    </p:extLst>
+  </p:cSld>
+  <p:clrMapOvr>
+    <a:masterClrMapping/>
+  </p:clrMapOvr>
+  <mc:AlternateContent xmlns:mc="http://schemas.openxmlformats.org/markup-compatibility/2006" xmlns:p159="http://schemas.microsoft.com/office/powerpoint/2015/09/main">
+    <mc:Choice Requires="p159">
+      <p:transition xmlns:p14="http://schemas.microsoft.com/office/powerpoint/2010/main" spd="slow" p14:dur="2000">
+        <p159:morph option="byObject"/>
+      </p:transition>
+    </mc:Choice>
+    <mc:Fallback xmlns="">
+      <p:transition spd="slow">
+        <p:fade/>
+      </p:transition>
+    </mc:Fallback>
+  </mc:AlternateContent>
+</p:sld>
+</file>
+
+<file path=ppt/slides/slide23.xml><?xml version="1.0" encoding="utf-8"?>
+<p:sld xmlns:a="http://schemas.openxmlformats.org/drawingml/2006/main" xmlns:r="http://schemas.openxmlformats.org/officeDocument/2006/relationships" xmlns:p="http://schemas.openxmlformats.org/presentationml/2006/main">
+  <p:cSld>
+    <p:spTree>
+      <p:nvGrpSpPr>
+        <p:cNvPr id="1" name="">
+          <a:extLst>
+            <a:ext uri="{FF2B5EF4-FFF2-40B4-BE49-F238E27FC236}">
+              <a16:creationId xmlns:a16="http://schemas.microsoft.com/office/drawing/2014/main" id="{F3A26584-D098-AF76-0AAC-96E501371AC8}"/>
+            </a:ext>
+          </a:extLst>
+        </p:cNvPr>
+        <p:cNvGrpSpPr/>
+        <p:nvPr/>
+      </p:nvGrpSpPr>
+      <p:grpSpPr>
+        <a:xfrm>
+          <a:off x="0" y="0"/>
+          <a:ext cx="0" cy="0"/>
+          <a:chOff x="0" y="0"/>
+          <a:chExt cx="0" cy="0"/>
+        </a:xfrm>
+      </p:grpSpPr>
+      <p:pic>
+        <p:nvPicPr>
+          <p:cNvPr id="17" name="Image 16">
+            <a:extLst>
+              <a:ext uri="{FF2B5EF4-FFF2-40B4-BE49-F238E27FC236}">
+                <a16:creationId xmlns:a16="http://schemas.microsoft.com/office/drawing/2014/main" id="{E80104E7-ADB0-E344-F012-7B63F2A1942F}"/>
+              </a:ext>
+            </a:extLst>
+          </p:cNvPr>
+          <p:cNvPicPr>
+            <a:picLocks noChangeAspect="1"/>
+          </p:cNvPicPr>
+          <p:nvPr/>
+        </p:nvPicPr>
+        <p:blipFill>
+          <a:blip r:embed="rId3"/>
+          <a:stretch>
+            <a:fillRect/>
+          </a:stretch>
+        </p:blipFill>
+        <p:spPr>
+          <a:xfrm>
+            <a:off x="12394194" y="1348687"/>
+            <a:ext cx="5304153" cy="3923818"/>
+          </a:xfrm>
+          <a:prstGeom prst="rect">
+            <a:avLst/>
+          </a:prstGeom>
+        </p:spPr>
+      </p:pic>
+      <p:sp>
+        <p:nvSpPr>
+          <p:cNvPr id="14" name="Cercle : creux 13">
+            <a:extLst>
+              <a:ext uri="{FF2B5EF4-FFF2-40B4-BE49-F238E27FC236}">
+                <a16:creationId xmlns:a16="http://schemas.microsoft.com/office/drawing/2014/main" id="{3C398F70-7601-661A-B93A-23B621B31146}"/>
+              </a:ext>
+            </a:extLst>
+          </p:cNvPr>
+          <p:cNvSpPr/>
+          <p:nvPr/>
+        </p:nvSpPr>
+        <p:spPr>
+          <a:xfrm>
+            <a:off x="-1996633" y="1467091"/>
+            <a:ext cx="3993265" cy="3923818"/>
+          </a:xfrm>
+          <a:prstGeom prst="donut">
+            <a:avLst/>
+          </a:prstGeom>
+          <a:gradFill flip="none" rotWithShape="1">
+            <a:gsLst>
+              <a:gs pos="0">
+                <a:srgbClr val="7030A0">
+                  <a:shade val="30000"/>
+                  <a:satMod val="115000"/>
+                </a:srgbClr>
+              </a:gs>
+              <a:gs pos="50000">
+                <a:srgbClr val="7030A0">
+                  <a:shade val="67500"/>
+                  <a:satMod val="115000"/>
+                </a:srgbClr>
+              </a:gs>
+              <a:gs pos="100000">
+                <a:srgbClr val="7030A0">
+                  <a:shade val="100000"/>
+                  <a:satMod val="115000"/>
+                </a:srgbClr>
+              </a:gs>
+            </a:gsLst>
+            <a:lin ang="10800000" scaled="1"/>
+            <a:tileRect/>
+          </a:gradFill>
+          <a:ln>
+            <a:noFill/>
+          </a:ln>
+        </p:spPr>
+        <p:style>
+          <a:lnRef idx="2">
+            <a:schemeClr val="accent1">
+              <a:shade val="15000"/>
+            </a:schemeClr>
+          </a:lnRef>
+          <a:fillRef idx="1">
+            <a:schemeClr val="accent1"/>
+          </a:fillRef>
+          <a:effectRef idx="0">
+            <a:schemeClr val="accent1"/>
+          </a:effectRef>
+          <a:fontRef idx="minor">
+            <a:schemeClr val="lt1"/>
+          </a:fontRef>
+        </p:style>
+        <p:txBody>
+          <a:bodyPr rtlCol="0" anchor="ctr"/>
+          <a:lstStyle/>
+          <a:p>
+            <a:pPr algn="ctr"/>
+            <a:endParaRPr lang="fr-FR">
+              <a:solidFill>
+                <a:schemeClr val="tx1"/>
+              </a:solidFill>
+            </a:endParaRPr>
+          </a:p>
+        </p:txBody>
+      </p:sp>
+      <p:sp>
+        <p:nvSpPr>
+          <p:cNvPr id="16" name="Arc plein 15">
+            <a:extLst>
+              <a:ext uri="{FF2B5EF4-FFF2-40B4-BE49-F238E27FC236}">
+                <a16:creationId xmlns:a16="http://schemas.microsoft.com/office/drawing/2014/main" id="{019F4E7D-E50A-A1BA-ADF6-DC5BC260162B}"/>
+              </a:ext>
+            </a:extLst>
+          </p:cNvPr>
+          <p:cNvSpPr/>
+          <p:nvPr/>
+        </p:nvSpPr>
+        <p:spPr>
+          <a:xfrm rot="18821318">
+            <a:off x="-1996633" y="1467091"/>
+            <a:ext cx="3993265" cy="3923818"/>
+          </a:xfrm>
+          <a:prstGeom prst="blockArc">
+            <a:avLst>
+              <a:gd name="adj1" fmla="val 18889740"/>
+              <a:gd name="adj2" fmla="val 0"/>
+              <a:gd name="adj3" fmla="val 25000"/>
+            </a:avLst>
+          </a:prstGeom>
+          <a:solidFill>
+            <a:srgbClr val="FFC000"/>
+          </a:solidFill>
+          <a:ln>
+            <a:noFill/>
+          </a:ln>
+        </p:spPr>
+        <p:style>
+          <a:lnRef idx="2">
+            <a:schemeClr val="accent1">
+              <a:shade val="15000"/>
+            </a:schemeClr>
+          </a:lnRef>
+          <a:fillRef idx="1">
+            <a:schemeClr val="accent1"/>
+          </a:fillRef>
+          <a:effectRef idx="0">
+            <a:schemeClr val="accent1"/>
+          </a:effectRef>
+          <a:fontRef idx="minor">
+            <a:schemeClr val="lt1"/>
+          </a:fontRef>
+        </p:style>
+        <p:txBody>
+          <a:bodyPr rtlCol="0" anchor="ctr"/>
+          <a:lstStyle/>
+          <a:p>
+            <a:pPr algn="ctr"/>
+            <a:endParaRPr lang="fr-FR">
+              <a:solidFill>
+                <a:schemeClr val="tx1"/>
+              </a:solidFill>
+            </a:endParaRPr>
+          </a:p>
+        </p:txBody>
+      </p:sp>
+      <p:pic>
+        <p:nvPicPr>
+          <p:cNvPr id="3" name="Graphique 2" descr="Livres sur une étagère avec un remplissage uni">
+            <a:extLst>
+              <a:ext uri="{FF2B5EF4-FFF2-40B4-BE49-F238E27FC236}">
+                <a16:creationId xmlns:a16="http://schemas.microsoft.com/office/drawing/2014/main" id="{23A9DC59-41D4-0374-3C95-2943DB9184D3}"/>
+              </a:ext>
+            </a:extLst>
+          </p:cNvPr>
+          <p:cNvPicPr>
+            <a:picLocks noChangeAspect="1"/>
+          </p:cNvPicPr>
+          <p:nvPr/>
+        </p:nvPicPr>
+        <p:blipFill>
+          <a:blip r:embed="rId4">
+            <a:extLst>
+              <a:ext uri="{96DAC541-7B7A-43D3-8B79-37D633B846F1}">
+                <asvg:svgBlip xmlns:asvg="http://schemas.microsoft.com/office/drawing/2016/SVG/main" r:embed="rId5"/>
+              </a:ext>
+            </a:extLst>
+          </a:blip>
+          <a:stretch>
+            <a:fillRect/>
+          </a:stretch>
+        </p:blipFill>
+        <p:spPr>
+          <a:xfrm>
+            <a:off x="-1026250" y="4358105"/>
+            <a:ext cx="914400" cy="914400"/>
+          </a:xfrm>
+          <a:prstGeom prst="rect">
+            <a:avLst/>
+          </a:prstGeom>
+        </p:spPr>
+      </p:pic>
+      <p:pic>
+        <p:nvPicPr>
+          <p:cNvPr id="5" name="Graphique 4" descr="Informatique hébergé avec un remplissage uni">
+            <a:extLst>
+              <a:ext uri="{FF2B5EF4-FFF2-40B4-BE49-F238E27FC236}">
+                <a16:creationId xmlns:a16="http://schemas.microsoft.com/office/drawing/2014/main" id="{E30CEEAE-D54D-6AC7-6F87-76196C6843DE}"/>
+              </a:ext>
+            </a:extLst>
+          </p:cNvPr>
+          <p:cNvPicPr>
+            <a:picLocks noChangeAspect="1"/>
+          </p:cNvPicPr>
+          <p:nvPr/>
+        </p:nvPicPr>
+        <p:blipFill>
+          <a:blip r:embed="rId6">
+            <a:extLst>
+              <a:ext uri="{96DAC541-7B7A-43D3-8B79-37D633B846F1}">
+                <asvg:svgBlip xmlns:asvg="http://schemas.microsoft.com/office/drawing/2016/SVG/main" r:embed="rId7"/>
+              </a:ext>
+            </a:extLst>
+          </a:blip>
+          <a:stretch>
+            <a:fillRect/>
+          </a:stretch>
+        </p:blipFill>
+        <p:spPr>
+          <a:xfrm>
+            <a:off x="159038" y="4358104"/>
+            <a:ext cx="914400" cy="914400"/>
+          </a:xfrm>
+          <a:prstGeom prst="rect">
+            <a:avLst/>
+          </a:prstGeom>
+        </p:spPr>
+      </p:pic>
+      <p:pic>
+        <p:nvPicPr>
+          <p:cNvPr id="7" name="Graphique 6" descr="Ordinateur avec un remplissage uni">
+            <a:extLst>
+              <a:ext uri="{FF2B5EF4-FFF2-40B4-BE49-F238E27FC236}">
+                <a16:creationId xmlns:a16="http://schemas.microsoft.com/office/drawing/2014/main" id="{CA926E92-D68F-49B6-3AA5-3D6B59D6FBD4}"/>
+              </a:ext>
+            </a:extLst>
+          </p:cNvPr>
+          <p:cNvPicPr>
+            <a:picLocks noChangeAspect="1"/>
+          </p:cNvPicPr>
+          <p:nvPr/>
+        </p:nvPicPr>
+        <p:blipFill>
+          <a:blip r:embed="rId8">
+            <a:extLst>
+              <a:ext uri="{96DAC541-7B7A-43D3-8B79-37D633B846F1}">
+                <asvg:svgBlip xmlns:asvg="http://schemas.microsoft.com/office/drawing/2016/SVG/main" r:embed="rId9"/>
+              </a:ext>
+            </a:extLst>
+          </a:blip>
+          <a:stretch>
+            <a:fillRect/>
+          </a:stretch>
+        </p:blipFill>
+        <p:spPr>
+          <a:xfrm>
+            <a:off x="929358" y="2435614"/>
+            <a:ext cx="914400" cy="914400"/>
+          </a:xfrm>
+          <a:prstGeom prst="rect">
+            <a:avLst/>
+          </a:prstGeom>
+        </p:spPr>
+      </p:pic>
+      <p:pic>
+        <p:nvPicPr>
+          <p:cNvPr id="10" name="Graphique 9" descr="Enveloppe avec un remplissage uni">
+            <a:extLst>
+              <a:ext uri="{FF2B5EF4-FFF2-40B4-BE49-F238E27FC236}">
+                <a16:creationId xmlns:a16="http://schemas.microsoft.com/office/drawing/2014/main" id="{E27DE87A-29F3-6696-41B3-90E99F7B9F82}"/>
+              </a:ext>
+            </a:extLst>
+          </p:cNvPr>
+          <p:cNvPicPr>
+            <a:picLocks noChangeAspect="1"/>
+          </p:cNvPicPr>
+          <p:nvPr/>
+        </p:nvPicPr>
+        <p:blipFill>
+          <a:blip r:embed="rId10">
+            <a:extLst>
+              <a:ext uri="{96DAC541-7B7A-43D3-8B79-37D633B846F1}">
+                <asvg:svgBlip xmlns:asvg="http://schemas.microsoft.com/office/drawing/2016/SVG/main" r:embed="rId11"/>
+              </a:ext>
+            </a:extLst>
+          </a:blip>
+          <a:stretch>
+            <a:fillRect/>
+          </a:stretch>
+        </p:blipFill>
+        <p:spPr>
+          <a:xfrm>
+            <a:off x="929358" y="3488202"/>
+            <a:ext cx="914400" cy="914400"/>
+          </a:xfrm>
+          <a:prstGeom prst="rect">
+            <a:avLst/>
+          </a:prstGeom>
+        </p:spPr>
+      </p:pic>
+      <p:pic>
+        <p:nvPicPr>
+          <p:cNvPr id="6" name="Graphique 5" descr="Personne confuse avec un remplissage uni">
+            <a:extLst>
+              <a:ext uri="{FF2B5EF4-FFF2-40B4-BE49-F238E27FC236}">
+                <a16:creationId xmlns:a16="http://schemas.microsoft.com/office/drawing/2014/main" id="{459DB77F-5B2D-EDA2-47C7-DDB83329A5DC}"/>
+              </a:ext>
+            </a:extLst>
+          </p:cNvPr>
+          <p:cNvPicPr>
+            <a:picLocks noChangeAspect="1"/>
+          </p:cNvPicPr>
+          <p:nvPr/>
+        </p:nvPicPr>
+        <p:blipFill>
+          <a:blip r:embed="rId12">
+            <a:extLst>
+              <a:ext uri="{96DAC541-7B7A-43D3-8B79-37D633B846F1}">
+                <asvg:svgBlip xmlns:asvg="http://schemas.microsoft.com/office/drawing/2016/SVG/main" r:embed="rId13"/>
+              </a:ext>
+            </a:extLst>
+          </a:blip>
+          <a:stretch>
+            <a:fillRect/>
+          </a:stretch>
+        </p:blipFill>
+        <p:spPr>
+          <a:xfrm rot="10800000">
+            <a:off x="-1965768" y="2928395"/>
+            <a:ext cx="914400" cy="914400"/>
+          </a:xfrm>
+          <a:prstGeom prst="rect">
+            <a:avLst/>
+          </a:prstGeom>
+        </p:spPr>
+      </p:pic>
+      <p:pic>
+        <p:nvPicPr>
+          <p:cNvPr id="4" name="Image 3">
+            <a:extLst>
+              <a:ext uri="{FF2B5EF4-FFF2-40B4-BE49-F238E27FC236}">
+                <a16:creationId xmlns:a16="http://schemas.microsoft.com/office/drawing/2014/main" id="{97DA7F46-CDC5-B6C2-93BD-C8EFD4491DBE}"/>
+              </a:ext>
+            </a:extLst>
+          </p:cNvPr>
+          <p:cNvPicPr>
+            <a:picLocks noChangeAspect="1"/>
+          </p:cNvPicPr>
+          <p:nvPr/>
+        </p:nvPicPr>
+        <p:blipFill>
+          <a:blip r:embed="rId14"/>
+          <a:srcRect r="-134" b="5652"/>
+          <a:stretch>
+            <a:fillRect/>
+          </a:stretch>
+        </p:blipFill>
+        <p:spPr>
+          <a:xfrm>
+            <a:off x="4458313" y="-6858000"/>
+            <a:ext cx="3275371" cy="6858000"/>
+          </a:xfrm>
+          <a:prstGeom prst="rect">
+            <a:avLst/>
+          </a:prstGeom>
+        </p:spPr>
+      </p:pic>
+      <p:sp>
+        <p:nvSpPr>
+          <p:cNvPr id="9" name="ZoneTexte 8">
+            <a:extLst>
+              <a:ext uri="{FF2B5EF4-FFF2-40B4-BE49-F238E27FC236}">
+                <a16:creationId xmlns:a16="http://schemas.microsoft.com/office/drawing/2014/main" id="{99CF14CF-84E0-6D10-A772-57385A01A643}"/>
+              </a:ext>
+            </a:extLst>
+          </p:cNvPr>
+          <p:cNvSpPr txBox="1"/>
+          <p:nvPr/>
+        </p:nvSpPr>
+        <p:spPr>
+          <a:xfrm>
+            <a:off x="7733684" y="-6858000"/>
+            <a:ext cx="3376819" cy="769441"/>
+          </a:xfrm>
+          <a:prstGeom prst="rect">
+            <a:avLst/>
+          </a:prstGeom>
+          <a:noFill/>
+        </p:spPr>
+        <p:txBody>
+          <a:bodyPr wrap="square" rtlCol="0">
+            <a:spAutoFit/>
+          </a:bodyPr>
+          <a:lstStyle/>
+          <a:p>
+            <a:r>
+              <a:rPr lang="fr-FR" sz="4400" dirty="0">
+                <a:latin typeface="Pristina" panose="03060402040406080204" pitchFamily="66" charset="0"/>
+              </a:rPr>
+              <a:t>Upload d’images</a:t>
+            </a:r>
+          </a:p>
+        </p:txBody>
+      </p:sp>
+      <p:sp>
+        <p:nvSpPr>
+          <p:cNvPr id="12" name="ZoneTexte 11">
+            <a:extLst>
+              <a:ext uri="{FF2B5EF4-FFF2-40B4-BE49-F238E27FC236}">
+                <a16:creationId xmlns:a16="http://schemas.microsoft.com/office/drawing/2014/main" id="{024DD1E2-6755-5CFF-8C66-5664E9972D9F}"/>
+              </a:ext>
+            </a:extLst>
+          </p:cNvPr>
+          <p:cNvSpPr txBox="1"/>
+          <p:nvPr/>
+        </p:nvSpPr>
+        <p:spPr>
+          <a:xfrm>
+            <a:off x="9422093" y="-3267692"/>
+            <a:ext cx="2318263" cy="1446550"/>
+          </a:xfrm>
+          <a:prstGeom prst="rect">
+            <a:avLst/>
+          </a:prstGeom>
+          <a:noFill/>
+        </p:spPr>
+        <p:txBody>
+          <a:bodyPr wrap="none" rtlCol="0">
+            <a:spAutoFit/>
+          </a:bodyPr>
+          <a:lstStyle/>
+          <a:p>
+            <a:pPr marL="285750" indent="-285750">
+              <a:buFontTx/>
+              <a:buChar char="-"/>
+            </a:pPr>
+            <a:r>
+              <a:rPr lang="fr-FR" sz="4400" dirty="0">
+                <a:latin typeface="Pristina" panose="03060402040406080204" pitchFamily="66" charset="0"/>
+              </a:rPr>
+              <a:t>Bouton de</a:t>
+            </a:r>
+          </a:p>
+          <a:p>
+            <a:r>
+              <a:rPr lang="fr-FR" sz="4400" dirty="0">
+                <a:latin typeface="Pristina" panose="03060402040406080204" pitchFamily="66" charset="0"/>
+              </a:rPr>
+              <a:t>déconnexion</a:t>
+            </a:r>
+          </a:p>
+        </p:txBody>
+      </p:sp>
+      <p:sp>
+        <p:nvSpPr>
+          <p:cNvPr id="13" name="ZoneTexte 12">
+            <a:extLst>
+              <a:ext uri="{FF2B5EF4-FFF2-40B4-BE49-F238E27FC236}">
+                <a16:creationId xmlns:a16="http://schemas.microsoft.com/office/drawing/2014/main" id="{4CF2107C-2D7A-28A6-0F8A-1EFAE2563E83}"/>
+              </a:ext>
+            </a:extLst>
+          </p:cNvPr>
+          <p:cNvSpPr txBox="1"/>
+          <p:nvPr/>
+        </p:nvSpPr>
+        <p:spPr>
+          <a:xfrm rot="3932945">
+            <a:off x="10897064" y="3044279"/>
+            <a:ext cx="6304010" cy="769441"/>
+          </a:xfrm>
+          <a:prstGeom prst="rect">
+            <a:avLst/>
+          </a:prstGeom>
+          <a:noFill/>
+        </p:spPr>
+        <p:txBody>
+          <a:bodyPr wrap="square" rtlCol="0">
+            <a:spAutoFit/>
+          </a:bodyPr>
+          <a:lstStyle/>
+          <a:p>
+            <a:r>
+              <a:rPr lang="fr-FR" sz="4400" dirty="0">
+                <a:latin typeface="Symbol" panose="05050102010706020507" pitchFamily="18" charset="2"/>
+              </a:rPr>
+              <a:t>Diagrammes utilisés</a:t>
+            </a:r>
+          </a:p>
+        </p:txBody>
+      </p:sp>
+      <p:sp>
+        <p:nvSpPr>
+          <p:cNvPr id="8" name="ZoneTexte 7">
+            <a:extLst>
+              <a:ext uri="{FF2B5EF4-FFF2-40B4-BE49-F238E27FC236}">
+                <a16:creationId xmlns:a16="http://schemas.microsoft.com/office/drawing/2014/main" id="{7DAA5475-DC88-B2D7-0DE3-5C86EC728BE3}"/>
+              </a:ext>
+            </a:extLst>
+          </p:cNvPr>
+          <p:cNvSpPr txBox="1"/>
+          <p:nvPr/>
+        </p:nvSpPr>
+        <p:spPr>
+          <a:xfrm>
+            <a:off x="1843758" y="6853949"/>
+            <a:ext cx="6304010" cy="1446550"/>
+          </a:xfrm>
+          <a:prstGeom prst="rect">
+            <a:avLst/>
+          </a:prstGeom>
+          <a:noFill/>
+        </p:spPr>
+        <p:txBody>
+          <a:bodyPr wrap="square" rtlCol="0">
+            <a:spAutoFit/>
+          </a:bodyPr>
+          <a:lstStyle/>
+          <a:p>
+            <a:r>
+              <a:rPr lang="fr-FR" sz="4400" dirty="0">
+                <a:latin typeface="Snap ITC" panose="04040A07060A02020202" pitchFamily="82" charset="0"/>
+              </a:rPr>
+              <a:t>Diagrammes utilisés</a:t>
+            </a:r>
+          </a:p>
+        </p:txBody>
+      </p:sp>
+      <p:pic>
+        <p:nvPicPr>
+          <p:cNvPr id="11" name="Image 10">
+            <a:extLst>
+              <a:ext uri="{FF2B5EF4-FFF2-40B4-BE49-F238E27FC236}">
+                <a16:creationId xmlns:a16="http://schemas.microsoft.com/office/drawing/2014/main" id="{9FB187B9-9671-45AD-69F5-E6C6867FACA9}"/>
+              </a:ext>
+            </a:extLst>
+          </p:cNvPr>
+          <p:cNvPicPr>
+            <a:picLocks noChangeAspect="1"/>
+          </p:cNvPicPr>
+          <p:nvPr/>
+        </p:nvPicPr>
+        <p:blipFill>
+          <a:blip r:embed="rId15"/>
+          <a:stretch>
+            <a:fillRect/>
+          </a:stretch>
+        </p:blipFill>
+        <p:spPr>
+          <a:xfrm>
+            <a:off x="13335476" y="-121599"/>
+            <a:ext cx="6044612" cy="7014386"/>
+          </a:xfrm>
+          <a:prstGeom prst="rect">
+            <a:avLst/>
+          </a:prstGeom>
+        </p:spPr>
+      </p:pic>
+      <p:pic>
+        <p:nvPicPr>
+          <p:cNvPr id="15" name="Graphique 14" descr="Cerveau dans une tête avec un remplissage uni">
+            <a:extLst>
+              <a:ext uri="{FF2B5EF4-FFF2-40B4-BE49-F238E27FC236}">
+                <a16:creationId xmlns:a16="http://schemas.microsoft.com/office/drawing/2014/main" id="{BACC8703-885E-3719-E5B3-1C7CD907898C}"/>
+              </a:ext>
+            </a:extLst>
+          </p:cNvPr>
+          <p:cNvPicPr>
+            <a:picLocks noChangeAspect="1"/>
+          </p:cNvPicPr>
+          <p:nvPr/>
+        </p:nvPicPr>
+        <p:blipFill>
+          <a:blip r:embed="rId16">
+            <a:extLst>
+              <a:ext uri="{96DAC541-7B7A-43D3-8B79-37D633B846F1}">
+                <asvg:svgBlip xmlns:asvg="http://schemas.microsoft.com/office/drawing/2016/SVG/main" r:embed="rId17"/>
+              </a:ext>
+            </a:extLst>
+          </a:blip>
+          <a:stretch>
+            <a:fillRect/>
+          </a:stretch>
+        </p:blipFill>
+        <p:spPr>
+          <a:xfrm>
+            <a:off x="14958" y="1585496"/>
+            <a:ext cx="914400" cy="914400"/>
+          </a:xfrm>
+          <a:prstGeom prst="rect">
+            <a:avLst/>
+          </a:prstGeom>
+        </p:spPr>
+      </p:pic>
+      <p:sp>
+        <p:nvSpPr>
+          <p:cNvPr id="18" name="ZoneTexte 17">
+            <a:extLst>
+              <a:ext uri="{FF2B5EF4-FFF2-40B4-BE49-F238E27FC236}">
+                <a16:creationId xmlns:a16="http://schemas.microsoft.com/office/drawing/2014/main" id="{D1B8A94F-107F-A00E-FFA8-957E2CCA9881}"/>
+              </a:ext>
+            </a:extLst>
+          </p:cNvPr>
+          <p:cNvSpPr txBox="1"/>
+          <p:nvPr/>
+        </p:nvSpPr>
+        <p:spPr>
+          <a:xfrm>
+            <a:off x="2945936" y="15716"/>
+            <a:ext cx="6300123" cy="769441"/>
+          </a:xfrm>
+          <a:prstGeom prst="rect">
+            <a:avLst/>
+          </a:prstGeom>
+          <a:noFill/>
+        </p:spPr>
+        <p:txBody>
+          <a:bodyPr wrap="none" rtlCol="0">
+            <a:spAutoFit/>
+          </a:bodyPr>
+          <a:lstStyle/>
+          <a:p>
+            <a:r>
+              <a:rPr lang="fr-FR" sz="4400" dirty="0">
+                <a:latin typeface="Algerian" panose="04020705040A02060702" pitchFamily="82" charset="0"/>
+              </a:rPr>
+              <a:t>Les différents rôles</a:t>
+            </a:r>
+          </a:p>
+        </p:txBody>
+      </p:sp>
+      <p:pic>
+        <p:nvPicPr>
+          <p:cNvPr id="20" name="Image 19">
+            <a:extLst>
+              <a:ext uri="{FF2B5EF4-FFF2-40B4-BE49-F238E27FC236}">
+                <a16:creationId xmlns:a16="http://schemas.microsoft.com/office/drawing/2014/main" id="{2240BBB6-5767-69A8-C410-43086DEDCFAB}"/>
+              </a:ext>
+            </a:extLst>
+          </p:cNvPr>
+          <p:cNvPicPr>
+            <a:picLocks noChangeAspect="1"/>
+          </p:cNvPicPr>
+          <p:nvPr/>
+        </p:nvPicPr>
+        <p:blipFill>
+          <a:blip r:embed="rId18"/>
+          <a:stretch>
+            <a:fillRect/>
+          </a:stretch>
+        </p:blipFill>
+        <p:spPr>
+          <a:xfrm>
+            <a:off x="3655292" y="-1364696"/>
+            <a:ext cx="4462796" cy="1259304"/>
+          </a:xfrm>
+          <a:prstGeom prst="rect">
+            <a:avLst/>
+          </a:prstGeom>
+        </p:spPr>
+      </p:pic>
+      <p:pic>
+        <p:nvPicPr>
+          <p:cNvPr id="22" name="Image 21">
+            <a:extLst>
+              <a:ext uri="{FF2B5EF4-FFF2-40B4-BE49-F238E27FC236}">
+                <a16:creationId xmlns:a16="http://schemas.microsoft.com/office/drawing/2014/main" id="{5447F3B8-2AEC-63D6-4C79-90BB37B3B170}"/>
+              </a:ext>
+            </a:extLst>
+          </p:cNvPr>
+          <p:cNvPicPr>
+            <a:picLocks noChangeAspect="1"/>
+          </p:cNvPicPr>
+          <p:nvPr/>
+        </p:nvPicPr>
+        <p:blipFill>
+          <a:blip r:embed="rId19"/>
+          <a:stretch>
+            <a:fillRect/>
+          </a:stretch>
+        </p:blipFill>
+        <p:spPr>
+          <a:xfrm>
+            <a:off x="3655292" y="-2219348"/>
+            <a:ext cx="4462796" cy="2113956"/>
+          </a:xfrm>
+          <a:prstGeom prst="rect">
+            <a:avLst/>
+          </a:prstGeom>
+        </p:spPr>
+      </p:pic>
+    </p:spTree>
+    <p:extLst>
+      <p:ext uri="{BB962C8B-B14F-4D97-AF65-F5344CB8AC3E}">
+        <p14:creationId xmlns:p14="http://schemas.microsoft.com/office/powerpoint/2010/main" val="199521561"/>
       </p:ext>
     </p:extLst>
   </p:cSld>
@@ -17030,7 +18143,1505 @@
 </p:sld>
 </file>
 
-<file path=ppt/slides/slide23.xml><?xml version="1.0" encoding="utf-8"?>
+<file path=ppt/slides/slide24.xml><?xml version="1.0" encoding="utf-8"?>
+<p:sld xmlns:a="http://schemas.openxmlformats.org/drawingml/2006/main" xmlns:r="http://schemas.openxmlformats.org/officeDocument/2006/relationships" xmlns:p="http://schemas.openxmlformats.org/presentationml/2006/main">
+  <p:cSld>
+    <p:spTree>
+      <p:nvGrpSpPr>
+        <p:cNvPr id="1" name="">
+          <a:extLst>
+            <a:ext uri="{FF2B5EF4-FFF2-40B4-BE49-F238E27FC236}">
+              <a16:creationId xmlns:a16="http://schemas.microsoft.com/office/drawing/2014/main" id="{F0A13AF0-8A72-5659-4908-8544226FF45A}"/>
+            </a:ext>
+          </a:extLst>
+        </p:cNvPr>
+        <p:cNvGrpSpPr/>
+        <p:nvPr/>
+      </p:nvGrpSpPr>
+      <p:grpSpPr>
+        <a:xfrm>
+          <a:off x="0" y="0"/>
+          <a:ext cx="0" cy="0"/>
+          <a:chOff x="0" y="0"/>
+          <a:chExt cx="0" cy="0"/>
+        </a:xfrm>
+      </p:grpSpPr>
+      <p:pic>
+        <p:nvPicPr>
+          <p:cNvPr id="17" name="Image 16">
+            <a:extLst>
+              <a:ext uri="{FF2B5EF4-FFF2-40B4-BE49-F238E27FC236}">
+                <a16:creationId xmlns:a16="http://schemas.microsoft.com/office/drawing/2014/main" id="{5A092521-8163-F4DB-4F14-84E7D70EF7A7}"/>
+              </a:ext>
+            </a:extLst>
+          </p:cNvPr>
+          <p:cNvPicPr>
+            <a:picLocks noChangeAspect="1"/>
+          </p:cNvPicPr>
+          <p:nvPr/>
+        </p:nvPicPr>
+        <p:blipFill>
+          <a:blip r:embed="rId3"/>
+          <a:stretch>
+            <a:fillRect/>
+          </a:stretch>
+        </p:blipFill>
+        <p:spPr>
+          <a:xfrm>
+            <a:off x="12394194" y="1348687"/>
+            <a:ext cx="5304153" cy="3923818"/>
+          </a:xfrm>
+          <a:prstGeom prst="rect">
+            <a:avLst/>
+          </a:prstGeom>
+        </p:spPr>
+      </p:pic>
+      <p:sp>
+        <p:nvSpPr>
+          <p:cNvPr id="14" name="Cercle : creux 13">
+            <a:extLst>
+              <a:ext uri="{FF2B5EF4-FFF2-40B4-BE49-F238E27FC236}">
+                <a16:creationId xmlns:a16="http://schemas.microsoft.com/office/drawing/2014/main" id="{FBC42003-6B74-28AC-46B7-7ABBF2DE7C29}"/>
+              </a:ext>
+            </a:extLst>
+          </p:cNvPr>
+          <p:cNvSpPr/>
+          <p:nvPr/>
+        </p:nvSpPr>
+        <p:spPr>
+          <a:xfrm>
+            <a:off x="-1996633" y="1467091"/>
+            <a:ext cx="3993265" cy="3923818"/>
+          </a:xfrm>
+          <a:prstGeom prst="donut">
+            <a:avLst/>
+          </a:prstGeom>
+          <a:gradFill flip="none" rotWithShape="1">
+            <a:gsLst>
+              <a:gs pos="0">
+                <a:srgbClr val="7030A0">
+                  <a:shade val="30000"/>
+                  <a:satMod val="115000"/>
+                </a:srgbClr>
+              </a:gs>
+              <a:gs pos="50000">
+                <a:srgbClr val="7030A0">
+                  <a:shade val="67500"/>
+                  <a:satMod val="115000"/>
+                </a:srgbClr>
+              </a:gs>
+              <a:gs pos="100000">
+                <a:srgbClr val="7030A0">
+                  <a:shade val="100000"/>
+                  <a:satMod val="115000"/>
+                </a:srgbClr>
+              </a:gs>
+            </a:gsLst>
+            <a:lin ang="10800000" scaled="1"/>
+            <a:tileRect/>
+          </a:gradFill>
+          <a:ln>
+            <a:noFill/>
+          </a:ln>
+        </p:spPr>
+        <p:style>
+          <a:lnRef idx="2">
+            <a:schemeClr val="accent1">
+              <a:shade val="15000"/>
+            </a:schemeClr>
+          </a:lnRef>
+          <a:fillRef idx="1">
+            <a:schemeClr val="accent1"/>
+          </a:fillRef>
+          <a:effectRef idx="0">
+            <a:schemeClr val="accent1"/>
+          </a:effectRef>
+          <a:fontRef idx="minor">
+            <a:schemeClr val="lt1"/>
+          </a:fontRef>
+        </p:style>
+        <p:txBody>
+          <a:bodyPr rtlCol="0" anchor="ctr"/>
+          <a:lstStyle/>
+          <a:p>
+            <a:pPr algn="ctr"/>
+            <a:endParaRPr lang="fr-FR">
+              <a:solidFill>
+                <a:schemeClr val="tx1"/>
+              </a:solidFill>
+            </a:endParaRPr>
+          </a:p>
+        </p:txBody>
+      </p:sp>
+      <p:sp>
+        <p:nvSpPr>
+          <p:cNvPr id="16" name="Arc plein 15">
+            <a:extLst>
+              <a:ext uri="{FF2B5EF4-FFF2-40B4-BE49-F238E27FC236}">
+                <a16:creationId xmlns:a16="http://schemas.microsoft.com/office/drawing/2014/main" id="{6136DAFC-E218-79AD-9A51-DCC858B877F3}"/>
+              </a:ext>
+            </a:extLst>
+          </p:cNvPr>
+          <p:cNvSpPr/>
+          <p:nvPr/>
+        </p:nvSpPr>
+        <p:spPr>
+          <a:xfrm rot="18821318">
+            <a:off x="-1996633" y="1467091"/>
+            <a:ext cx="3993265" cy="3923818"/>
+          </a:xfrm>
+          <a:prstGeom prst="blockArc">
+            <a:avLst>
+              <a:gd name="adj1" fmla="val 18889740"/>
+              <a:gd name="adj2" fmla="val 0"/>
+              <a:gd name="adj3" fmla="val 25000"/>
+            </a:avLst>
+          </a:prstGeom>
+          <a:solidFill>
+            <a:srgbClr val="FFC000"/>
+          </a:solidFill>
+          <a:ln>
+            <a:noFill/>
+          </a:ln>
+        </p:spPr>
+        <p:style>
+          <a:lnRef idx="2">
+            <a:schemeClr val="accent1">
+              <a:shade val="15000"/>
+            </a:schemeClr>
+          </a:lnRef>
+          <a:fillRef idx="1">
+            <a:schemeClr val="accent1"/>
+          </a:fillRef>
+          <a:effectRef idx="0">
+            <a:schemeClr val="accent1"/>
+          </a:effectRef>
+          <a:fontRef idx="minor">
+            <a:schemeClr val="lt1"/>
+          </a:fontRef>
+        </p:style>
+        <p:txBody>
+          <a:bodyPr rtlCol="0" anchor="ctr"/>
+          <a:lstStyle/>
+          <a:p>
+            <a:pPr algn="ctr"/>
+            <a:endParaRPr lang="fr-FR">
+              <a:solidFill>
+                <a:schemeClr val="tx1"/>
+              </a:solidFill>
+            </a:endParaRPr>
+          </a:p>
+        </p:txBody>
+      </p:sp>
+      <p:pic>
+        <p:nvPicPr>
+          <p:cNvPr id="3" name="Graphique 2" descr="Livres sur une étagère avec un remplissage uni">
+            <a:extLst>
+              <a:ext uri="{FF2B5EF4-FFF2-40B4-BE49-F238E27FC236}">
+                <a16:creationId xmlns:a16="http://schemas.microsoft.com/office/drawing/2014/main" id="{A5BA443C-0032-B438-9044-814C7726AA8F}"/>
+              </a:ext>
+            </a:extLst>
+          </p:cNvPr>
+          <p:cNvPicPr>
+            <a:picLocks noChangeAspect="1"/>
+          </p:cNvPicPr>
+          <p:nvPr/>
+        </p:nvPicPr>
+        <p:blipFill>
+          <a:blip r:embed="rId4">
+            <a:extLst>
+              <a:ext uri="{96DAC541-7B7A-43D3-8B79-37D633B846F1}">
+                <asvg:svgBlip xmlns:asvg="http://schemas.microsoft.com/office/drawing/2016/SVG/main" r:embed="rId5"/>
+              </a:ext>
+            </a:extLst>
+          </a:blip>
+          <a:stretch>
+            <a:fillRect/>
+          </a:stretch>
+        </p:blipFill>
+        <p:spPr>
+          <a:xfrm>
+            <a:off x="-1026250" y="4358105"/>
+            <a:ext cx="914400" cy="914400"/>
+          </a:xfrm>
+          <a:prstGeom prst="rect">
+            <a:avLst/>
+          </a:prstGeom>
+        </p:spPr>
+      </p:pic>
+      <p:pic>
+        <p:nvPicPr>
+          <p:cNvPr id="5" name="Graphique 4" descr="Informatique hébergé avec un remplissage uni">
+            <a:extLst>
+              <a:ext uri="{FF2B5EF4-FFF2-40B4-BE49-F238E27FC236}">
+                <a16:creationId xmlns:a16="http://schemas.microsoft.com/office/drawing/2014/main" id="{39829D24-DA47-E353-AD2B-F68B30CE0ED7}"/>
+              </a:ext>
+            </a:extLst>
+          </p:cNvPr>
+          <p:cNvPicPr>
+            <a:picLocks noChangeAspect="1"/>
+          </p:cNvPicPr>
+          <p:nvPr/>
+        </p:nvPicPr>
+        <p:blipFill>
+          <a:blip r:embed="rId6">
+            <a:extLst>
+              <a:ext uri="{96DAC541-7B7A-43D3-8B79-37D633B846F1}">
+                <asvg:svgBlip xmlns:asvg="http://schemas.microsoft.com/office/drawing/2016/SVG/main" r:embed="rId7"/>
+              </a:ext>
+            </a:extLst>
+          </a:blip>
+          <a:stretch>
+            <a:fillRect/>
+          </a:stretch>
+        </p:blipFill>
+        <p:spPr>
+          <a:xfrm>
+            <a:off x="159038" y="4358104"/>
+            <a:ext cx="914400" cy="914400"/>
+          </a:xfrm>
+          <a:prstGeom prst="rect">
+            <a:avLst/>
+          </a:prstGeom>
+        </p:spPr>
+      </p:pic>
+      <p:pic>
+        <p:nvPicPr>
+          <p:cNvPr id="7" name="Graphique 6" descr="Ordinateur avec un remplissage uni">
+            <a:extLst>
+              <a:ext uri="{FF2B5EF4-FFF2-40B4-BE49-F238E27FC236}">
+                <a16:creationId xmlns:a16="http://schemas.microsoft.com/office/drawing/2014/main" id="{5D32CB53-C84D-D66E-1B1F-0FBF7324C126}"/>
+              </a:ext>
+            </a:extLst>
+          </p:cNvPr>
+          <p:cNvPicPr>
+            <a:picLocks noChangeAspect="1"/>
+          </p:cNvPicPr>
+          <p:nvPr/>
+        </p:nvPicPr>
+        <p:blipFill>
+          <a:blip r:embed="rId8">
+            <a:extLst>
+              <a:ext uri="{96DAC541-7B7A-43D3-8B79-37D633B846F1}">
+                <asvg:svgBlip xmlns:asvg="http://schemas.microsoft.com/office/drawing/2016/SVG/main" r:embed="rId9"/>
+              </a:ext>
+            </a:extLst>
+          </a:blip>
+          <a:stretch>
+            <a:fillRect/>
+          </a:stretch>
+        </p:blipFill>
+        <p:spPr>
+          <a:xfrm>
+            <a:off x="929358" y="2435614"/>
+            <a:ext cx="914400" cy="914400"/>
+          </a:xfrm>
+          <a:prstGeom prst="rect">
+            <a:avLst/>
+          </a:prstGeom>
+        </p:spPr>
+      </p:pic>
+      <p:pic>
+        <p:nvPicPr>
+          <p:cNvPr id="10" name="Graphique 9" descr="Enveloppe avec un remplissage uni">
+            <a:extLst>
+              <a:ext uri="{FF2B5EF4-FFF2-40B4-BE49-F238E27FC236}">
+                <a16:creationId xmlns:a16="http://schemas.microsoft.com/office/drawing/2014/main" id="{88F75B4A-2EDF-DD7C-B58B-02A70DA12F08}"/>
+              </a:ext>
+            </a:extLst>
+          </p:cNvPr>
+          <p:cNvPicPr>
+            <a:picLocks noChangeAspect="1"/>
+          </p:cNvPicPr>
+          <p:nvPr/>
+        </p:nvPicPr>
+        <p:blipFill>
+          <a:blip r:embed="rId10">
+            <a:extLst>
+              <a:ext uri="{96DAC541-7B7A-43D3-8B79-37D633B846F1}">
+                <asvg:svgBlip xmlns:asvg="http://schemas.microsoft.com/office/drawing/2016/SVG/main" r:embed="rId11"/>
+              </a:ext>
+            </a:extLst>
+          </a:blip>
+          <a:stretch>
+            <a:fillRect/>
+          </a:stretch>
+        </p:blipFill>
+        <p:spPr>
+          <a:xfrm>
+            <a:off x="929358" y="3488202"/>
+            <a:ext cx="914400" cy="914400"/>
+          </a:xfrm>
+          <a:prstGeom prst="rect">
+            <a:avLst/>
+          </a:prstGeom>
+        </p:spPr>
+      </p:pic>
+      <p:pic>
+        <p:nvPicPr>
+          <p:cNvPr id="6" name="Graphique 5" descr="Personne confuse avec un remplissage uni">
+            <a:extLst>
+              <a:ext uri="{FF2B5EF4-FFF2-40B4-BE49-F238E27FC236}">
+                <a16:creationId xmlns:a16="http://schemas.microsoft.com/office/drawing/2014/main" id="{BEF9C8EB-7086-3E7F-6B2F-3D18BA50A474}"/>
+              </a:ext>
+            </a:extLst>
+          </p:cNvPr>
+          <p:cNvPicPr>
+            <a:picLocks noChangeAspect="1"/>
+          </p:cNvPicPr>
+          <p:nvPr/>
+        </p:nvPicPr>
+        <p:blipFill>
+          <a:blip r:embed="rId12">
+            <a:extLst>
+              <a:ext uri="{96DAC541-7B7A-43D3-8B79-37D633B846F1}">
+                <asvg:svgBlip xmlns:asvg="http://schemas.microsoft.com/office/drawing/2016/SVG/main" r:embed="rId13"/>
+              </a:ext>
+            </a:extLst>
+          </a:blip>
+          <a:stretch>
+            <a:fillRect/>
+          </a:stretch>
+        </p:blipFill>
+        <p:spPr>
+          <a:xfrm rot="10800000">
+            <a:off x="-1965768" y="2928395"/>
+            <a:ext cx="914400" cy="914400"/>
+          </a:xfrm>
+          <a:prstGeom prst="rect">
+            <a:avLst/>
+          </a:prstGeom>
+        </p:spPr>
+      </p:pic>
+      <p:pic>
+        <p:nvPicPr>
+          <p:cNvPr id="4" name="Image 3">
+            <a:extLst>
+              <a:ext uri="{FF2B5EF4-FFF2-40B4-BE49-F238E27FC236}">
+                <a16:creationId xmlns:a16="http://schemas.microsoft.com/office/drawing/2014/main" id="{A54B4435-5980-CBED-CBB4-4258E8354724}"/>
+              </a:ext>
+            </a:extLst>
+          </p:cNvPr>
+          <p:cNvPicPr>
+            <a:picLocks noChangeAspect="1"/>
+          </p:cNvPicPr>
+          <p:nvPr/>
+        </p:nvPicPr>
+        <p:blipFill>
+          <a:blip r:embed="rId14"/>
+          <a:srcRect r="-134" b="5652"/>
+          <a:stretch>
+            <a:fillRect/>
+          </a:stretch>
+        </p:blipFill>
+        <p:spPr>
+          <a:xfrm>
+            <a:off x="4458313" y="-6858000"/>
+            <a:ext cx="3275371" cy="6858000"/>
+          </a:xfrm>
+          <a:prstGeom prst="rect">
+            <a:avLst/>
+          </a:prstGeom>
+        </p:spPr>
+      </p:pic>
+      <p:sp>
+        <p:nvSpPr>
+          <p:cNvPr id="9" name="ZoneTexte 8">
+            <a:extLst>
+              <a:ext uri="{FF2B5EF4-FFF2-40B4-BE49-F238E27FC236}">
+                <a16:creationId xmlns:a16="http://schemas.microsoft.com/office/drawing/2014/main" id="{FE99302E-4C53-E2E0-1DAA-DA508543C3BF}"/>
+              </a:ext>
+            </a:extLst>
+          </p:cNvPr>
+          <p:cNvSpPr txBox="1"/>
+          <p:nvPr/>
+        </p:nvSpPr>
+        <p:spPr>
+          <a:xfrm>
+            <a:off x="7733684" y="-6858000"/>
+            <a:ext cx="3376819" cy="769441"/>
+          </a:xfrm>
+          <a:prstGeom prst="rect">
+            <a:avLst/>
+          </a:prstGeom>
+          <a:noFill/>
+        </p:spPr>
+        <p:txBody>
+          <a:bodyPr wrap="square" rtlCol="0">
+            <a:spAutoFit/>
+          </a:bodyPr>
+          <a:lstStyle/>
+          <a:p>
+            <a:r>
+              <a:rPr lang="fr-FR" sz="4400" dirty="0">
+                <a:latin typeface="Pristina" panose="03060402040406080204" pitchFamily="66" charset="0"/>
+              </a:rPr>
+              <a:t>Upload d’images</a:t>
+            </a:r>
+          </a:p>
+        </p:txBody>
+      </p:sp>
+      <p:sp>
+        <p:nvSpPr>
+          <p:cNvPr id="12" name="ZoneTexte 11">
+            <a:extLst>
+              <a:ext uri="{FF2B5EF4-FFF2-40B4-BE49-F238E27FC236}">
+                <a16:creationId xmlns:a16="http://schemas.microsoft.com/office/drawing/2014/main" id="{0B5FD2B5-CD85-3022-8410-7C1F35A53091}"/>
+              </a:ext>
+            </a:extLst>
+          </p:cNvPr>
+          <p:cNvSpPr txBox="1"/>
+          <p:nvPr/>
+        </p:nvSpPr>
+        <p:spPr>
+          <a:xfrm>
+            <a:off x="9422093" y="-3267692"/>
+            <a:ext cx="2318263" cy="1446550"/>
+          </a:xfrm>
+          <a:prstGeom prst="rect">
+            <a:avLst/>
+          </a:prstGeom>
+          <a:noFill/>
+        </p:spPr>
+        <p:txBody>
+          <a:bodyPr wrap="none" rtlCol="0">
+            <a:spAutoFit/>
+          </a:bodyPr>
+          <a:lstStyle/>
+          <a:p>
+            <a:pPr marL="285750" indent="-285750">
+              <a:buFontTx/>
+              <a:buChar char="-"/>
+            </a:pPr>
+            <a:r>
+              <a:rPr lang="fr-FR" sz="4400" dirty="0">
+                <a:latin typeface="Pristina" panose="03060402040406080204" pitchFamily="66" charset="0"/>
+              </a:rPr>
+              <a:t>Bouton de</a:t>
+            </a:r>
+          </a:p>
+          <a:p>
+            <a:r>
+              <a:rPr lang="fr-FR" sz="4400" dirty="0">
+                <a:latin typeface="Pristina" panose="03060402040406080204" pitchFamily="66" charset="0"/>
+              </a:rPr>
+              <a:t>déconnexion</a:t>
+            </a:r>
+          </a:p>
+        </p:txBody>
+      </p:sp>
+      <p:sp>
+        <p:nvSpPr>
+          <p:cNvPr id="13" name="ZoneTexte 12">
+            <a:extLst>
+              <a:ext uri="{FF2B5EF4-FFF2-40B4-BE49-F238E27FC236}">
+                <a16:creationId xmlns:a16="http://schemas.microsoft.com/office/drawing/2014/main" id="{A4A47728-43B9-45F5-D94D-3655A22BA22B}"/>
+              </a:ext>
+            </a:extLst>
+          </p:cNvPr>
+          <p:cNvSpPr txBox="1"/>
+          <p:nvPr/>
+        </p:nvSpPr>
+        <p:spPr>
+          <a:xfrm rot="3932945">
+            <a:off x="10897064" y="3044279"/>
+            <a:ext cx="6304010" cy="769441"/>
+          </a:xfrm>
+          <a:prstGeom prst="rect">
+            <a:avLst/>
+          </a:prstGeom>
+          <a:noFill/>
+        </p:spPr>
+        <p:txBody>
+          <a:bodyPr wrap="square" rtlCol="0">
+            <a:spAutoFit/>
+          </a:bodyPr>
+          <a:lstStyle/>
+          <a:p>
+            <a:r>
+              <a:rPr lang="fr-FR" sz="4400" dirty="0">
+                <a:latin typeface="Symbol" panose="05050102010706020507" pitchFamily="18" charset="2"/>
+              </a:rPr>
+              <a:t>Diagrammes utilisés</a:t>
+            </a:r>
+          </a:p>
+        </p:txBody>
+      </p:sp>
+      <p:sp>
+        <p:nvSpPr>
+          <p:cNvPr id="8" name="ZoneTexte 7">
+            <a:extLst>
+              <a:ext uri="{FF2B5EF4-FFF2-40B4-BE49-F238E27FC236}">
+                <a16:creationId xmlns:a16="http://schemas.microsoft.com/office/drawing/2014/main" id="{36A4D160-A762-4ED3-D36B-0C55D79B43FE}"/>
+              </a:ext>
+            </a:extLst>
+          </p:cNvPr>
+          <p:cNvSpPr txBox="1"/>
+          <p:nvPr/>
+        </p:nvSpPr>
+        <p:spPr>
+          <a:xfrm>
+            <a:off x="1843758" y="6853949"/>
+            <a:ext cx="6304010" cy="1446550"/>
+          </a:xfrm>
+          <a:prstGeom prst="rect">
+            <a:avLst/>
+          </a:prstGeom>
+          <a:noFill/>
+        </p:spPr>
+        <p:txBody>
+          <a:bodyPr wrap="square" rtlCol="0">
+            <a:spAutoFit/>
+          </a:bodyPr>
+          <a:lstStyle/>
+          <a:p>
+            <a:r>
+              <a:rPr lang="fr-FR" sz="4400" dirty="0">
+                <a:latin typeface="Snap ITC" panose="04040A07060A02020202" pitchFamily="82" charset="0"/>
+              </a:rPr>
+              <a:t>Diagrammes utilisés</a:t>
+            </a:r>
+          </a:p>
+        </p:txBody>
+      </p:sp>
+      <p:pic>
+        <p:nvPicPr>
+          <p:cNvPr id="11" name="Image 10">
+            <a:extLst>
+              <a:ext uri="{FF2B5EF4-FFF2-40B4-BE49-F238E27FC236}">
+                <a16:creationId xmlns:a16="http://schemas.microsoft.com/office/drawing/2014/main" id="{2A7BAA8F-30AF-6E3E-2AA8-6E5AE965920B}"/>
+              </a:ext>
+            </a:extLst>
+          </p:cNvPr>
+          <p:cNvPicPr>
+            <a:picLocks noChangeAspect="1"/>
+          </p:cNvPicPr>
+          <p:nvPr/>
+        </p:nvPicPr>
+        <p:blipFill>
+          <a:blip r:embed="rId15"/>
+          <a:stretch>
+            <a:fillRect/>
+          </a:stretch>
+        </p:blipFill>
+        <p:spPr>
+          <a:xfrm>
+            <a:off x="13335476" y="-121599"/>
+            <a:ext cx="6044612" cy="7014386"/>
+          </a:xfrm>
+          <a:prstGeom prst="rect">
+            <a:avLst/>
+          </a:prstGeom>
+        </p:spPr>
+      </p:pic>
+      <p:pic>
+        <p:nvPicPr>
+          <p:cNvPr id="15" name="Graphique 14" descr="Cerveau dans une tête avec un remplissage uni">
+            <a:extLst>
+              <a:ext uri="{FF2B5EF4-FFF2-40B4-BE49-F238E27FC236}">
+                <a16:creationId xmlns:a16="http://schemas.microsoft.com/office/drawing/2014/main" id="{B3C44876-91FD-2621-1CA3-4C1DA2B764DD}"/>
+              </a:ext>
+            </a:extLst>
+          </p:cNvPr>
+          <p:cNvPicPr>
+            <a:picLocks noChangeAspect="1"/>
+          </p:cNvPicPr>
+          <p:nvPr/>
+        </p:nvPicPr>
+        <p:blipFill>
+          <a:blip r:embed="rId16">
+            <a:extLst>
+              <a:ext uri="{96DAC541-7B7A-43D3-8B79-37D633B846F1}">
+                <asvg:svgBlip xmlns:asvg="http://schemas.microsoft.com/office/drawing/2016/SVG/main" r:embed="rId17"/>
+              </a:ext>
+            </a:extLst>
+          </a:blip>
+          <a:stretch>
+            <a:fillRect/>
+          </a:stretch>
+        </p:blipFill>
+        <p:spPr>
+          <a:xfrm>
+            <a:off x="14958" y="1585496"/>
+            <a:ext cx="914400" cy="914400"/>
+          </a:xfrm>
+          <a:prstGeom prst="rect">
+            <a:avLst/>
+          </a:prstGeom>
+        </p:spPr>
+      </p:pic>
+      <p:sp>
+        <p:nvSpPr>
+          <p:cNvPr id="18" name="ZoneTexte 17">
+            <a:extLst>
+              <a:ext uri="{FF2B5EF4-FFF2-40B4-BE49-F238E27FC236}">
+                <a16:creationId xmlns:a16="http://schemas.microsoft.com/office/drawing/2014/main" id="{0D2B7274-CC37-BA8B-A367-88B333A905FE}"/>
+              </a:ext>
+            </a:extLst>
+          </p:cNvPr>
+          <p:cNvSpPr txBox="1"/>
+          <p:nvPr/>
+        </p:nvSpPr>
+        <p:spPr>
+          <a:xfrm>
+            <a:off x="2945936" y="15716"/>
+            <a:ext cx="6300123" cy="769441"/>
+          </a:xfrm>
+          <a:prstGeom prst="rect">
+            <a:avLst/>
+          </a:prstGeom>
+          <a:noFill/>
+        </p:spPr>
+        <p:txBody>
+          <a:bodyPr wrap="none" rtlCol="0">
+            <a:spAutoFit/>
+          </a:bodyPr>
+          <a:lstStyle/>
+          <a:p>
+            <a:r>
+              <a:rPr lang="fr-FR" sz="4400" dirty="0">
+                <a:latin typeface="Algerian" panose="04020705040A02060702" pitchFamily="82" charset="0"/>
+              </a:rPr>
+              <a:t>Les différents rôles</a:t>
+            </a:r>
+          </a:p>
+        </p:txBody>
+      </p:sp>
+      <p:pic>
+        <p:nvPicPr>
+          <p:cNvPr id="20" name="Image 19">
+            <a:extLst>
+              <a:ext uri="{FF2B5EF4-FFF2-40B4-BE49-F238E27FC236}">
+                <a16:creationId xmlns:a16="http://schemas.microsoft.com/office/drawing/2014/main" id="{93AFEF71-65B3-1A08-5068-55071DF07734}"/>
+              </a:ext>
+            </a:extLst>
+          </p:cNvPr>
+          <p:cNvPicPr>
+            <a:picLocks noChangeAspect="1"/>
+          </p:cNvPicPr>
+          <p:nvPr/>
+        </p:nvPicPr>
+        <p:blipFill>
+          <a:blip r:embed="rId18"/>
+          <a:stretch>
+            <a:fillRect/>
+          </a:stretch>
+        </p:blipFill>
+        <p:spPr>
+          <a:xfrm>
+            <a:off x="3599002" y="1206184"/>
+            <a:ext cx="4462796" cy="1259304"/>
+          </a:xfrm>
+          <a:prstGeom prst="rect">
+            <a:avLst/>
+          </a:prstGeom>
+        </p:spPr>
+      </p:pic>
+      <p:pic>
+        <p:nvPicPr>
+          <p:cNvPr id="22" name="Image 21">
+            <a:extLst>
+              <a:ext uri="{FF2B5EF4-FFF2-40B4-BE49-F238E27FC236}">
+                <a16:creationId xmlns:a16="http://schemas.microsoft.com/office/drawing/2014/main" id="{C1B9015A-DA94-C175-0142-5F2829661906}"/>
+              </a:ext>
+            </a:extLst>
+          </p:cNvPr>
+          <p:cNvPicPr>
+            <a:picLocks noChangeAspect="1"/>
+          </p:cNvPicPr>
+          <p:nvPr/>
+        </p:nvPicPr>
+        <p:blipFill>
+          <a:blip r:embed="rId19"/>
+          <a:stretch>
+            <a:fillRect/>
+          </a:stretch>
+        </p:blipFill>
+        <p:spPr>
+          <a:xfrm>
+            <a:off x="3599002" y="1206184"/>
+            <a:ext cx="4462796" cy="2113956"/>
+          </a:xfrm>
+          <a:prstGeom prst="rect">
+            <a:avLst/>
+          </a:prstGeom>
+        </p:spPr>
+      </p:pic>
+    </p:spTree>
+    <p:extLst>
+      <p:ext uri="{BB962C8B-B14F-4D97-AF65-F5344CB8AC3E}">
+        <p14:creationId xmlns:p14="http://schemas.microsoft.com/office/powerpoint/2010/main" val="3231082063"/>
+      </p:ext>
+    </p:extLst>
+  </p:cSld>
+  <p:clrMapOvr>
+    <a:masterClrMapping/>
+  </p:clrMapOvr>
+  <mc:AlternateContent xmlns:mc="http://schemas.openxmlformats.org/markup-compatibility/2006">
+    <mc:Choice xmlns:p159="http://schemas.microsoft.com/office/powerpoint/2015/09/main" Requires="p159">
+      <p:transition xmlns:p14="http://schemas.microsoft.com/office/powerpoint/2010/main" spd="slow" p14:dur="2000">
+        <p159:morph option="byObject"/>
+      </p:transition>
+    </mc:Choice>
+    <mc:Fallback>
+      <p:transition spd="slow">
+        <p:fade/>
+      </p:transition>
+    </mc:Fallback>
+  </mc:AlternateContent>
+</p:sld>
+</file>
+
+<file path=ppt/slides/slide25.xml><?xml version="1.0" encoding="utf-8"?>
+<p:sld xmlns:a="http://schemas.openxmlformats.org/drawingml/2006/main" xmlns:r="http://schemas.openxmlformats.org/officeDocument/2006/relationships" xmlns:p="http://schemas.openxmlformats.org/presentationml/2006/main">
+  <p:cSld>
+    <p:spTree>
+      <p:nvGrpSpPr>
+        <p:cNvPr id="1" name="">
+          <a:extLst>
+            <a:ext uri="{FF2B5EF4-FFF2-40B4-BE49-F238E27FC236}">
+              <a16:creationId xmlns:a16="http://schemas.microsoft.com/office/drawing/2014/main" id="{330D13BD-6E2B-2721-6C3F-BDA0C16F49A4}"/>
+            </a:ext>
+          </a:extLst>
+        </p:cNvPr>
+        <p:cNvGrpSpPr/>
+        <p:nvPr/>
+      </p:nvGrpSpPr>
+      <p:grpSpPr>
+        <a:xfrm>
+          <a:off x="0" y="0"/>
+          <a:ext cx="0" cy="0"/>
+          <a:chOff x="0" y="0"/>
+          <a:chExt cx="0" cy="0"/>
+        </a:xfrm>
+      </p:grpSpPr>
+      <p:pic>
+        <p:nvPicPr>
+          <p:cNvPr id="17" name="Image 16">
+            <a:extLst>
+              <a:ext uri="{FF2B5EF4-FFF2-40B4-BE49-F238E27FC236}">
+                <a16:creationId xmlns:a16="http://schemas.microsoft.com/office/drawing/2014/main" id="{0469532D-9C47-E369-5697-CB5FEF814306}"/>
+              </a:ext>
+            </a:extLst>
+          </p:cNvPr>
+          <p:cNvPicPr>
+            <a:picLocks noChangeAspect="1"/>
+          </p:cNvPicPr>
+          <p:nvPr/>
+        </p:nvPicPr>
+        <p:blipFill>
+          <a:blip r:embed="rId3"/>
+          <a:stretch>
+            <a:fillRect/>
+          </a:stretch>
+        </p:blipFill>
+        <p:spPr>
+          <a:xfrm>
+            <a:off x="12394194" y="1348687"/>
+            <a:ext cx="5304153" cy="3923818"/>
+          </a:xfrm>
+          <a:prstGeom prst="rect">
+            <a:avLst/>
+          </a:prstGeom>
+        </p:spPr>
+      </p:pic>
+      <p:sp>
+        <p:nvSpPr>
+          <p:cNvPr id="14" name="Cercle : creux 13">
+            <a:extLst>
+              <a:ext uri="{FF2B5EF4-FFF2-40B4-BE49-F238E27FC236}">
+                <a16:creationId xmlns:a16="http://schemas.microsoft.com/office/drawing/2014/main" id="{64A94A45-AD8D-FF7C-C054-1BBC65813F72}"/>
+              </a:ext>
+            </a:extLst>
+          </p:cNvPr>
+          <p:cNvSpPr/>
+          <p:nvPr/>
+        </p:nvSpPr>
+        <p:spPr>
+          <a:xfrm>
+            <a:off x="-1996633" y="1467091"/>
+            <a:ext cx="3993265" cy="3923818"/>
+          </a:xfrm>
+          <a:prstGeom prst="donut">
+            <a:avLst/>
+          </a:prstGeom>
+          <a:gradFill flip="none" rotWithShape="1">
+            <a:gsLst>
+              <a:gs pos="0">
+                <a:srgbClr val="7030A0">
+                  <a:shade val="30000"/>
+                  <a:satMod val="115000"/>
+                </a:srgbClr>
+              </a:gs>
+              <a:gs pos="50000">
+                <a:srgbClr val="7030A0">
+                  <a:shade val="67500"/>
+                  <a:satMod val="115000"/>
+                </a:srgbClr>
+              </a:gs>
+              <a:gs pos="100000">
+                <a:srgbClr val="7030A0">
+                  <a:shade val="100000"/>
+                  <a:satMod val="115000"/>
+                </a:srgbClr>
+              </a:gs>
+            </a:gsLst>
+            <a:lin ang="10800000" scaled="1"/>
+            <a:tileRect/>
+          </a:gradFill>
+          <a:ln>
+            <a:noFill/>
+          </a:ln>
+        </p:spPr>
+        <p:style>
+          <a:lnRef idx="2">
+            <a:schemeClr val="accent1">
+              <a:shade val="15000"/>
+            </a:schemeClr>
+          </a:lnRef>
+          <a:fillRef idx="1">
+            <a:schemeClr val="accent1"/>
+          </a:fillRef>
+          <a:effectRef idx="0">
+            <a:schemeClr val="accent1"/>
+          </a:effectRef>
+          <a:fontRef idx="minor">
+            <a:schemeClr val="lt1"/>
+          </a:fontRef>
+        </p:style>
+        <p:txBody>
+          <a:bodyPr rtlCol="0" anchor="ctr"/>
+          <a:lstStyle/>
+          <a:p>
+            <a:pPr algn="ctr"/>
+            <a:endParaRPr lang="fr-FR">
+              <a:solidFill>
+                <a:schemeClr val="tx1"/>
+              </a:solidFill>
+            </a:endParaRPr>
+          </a:p>
+        </p:txBody>
+      </p:sp>
+      <p:sp>
+        <p:nvSpPr>
+          <p:cNvPr id="16" name="Arc plein 15">
+            <a:extLst>
+              <a:ext uri="{FF2B5EF4-FFF2-40B4-BE49-F238E27FC236}">
+                <a16:creationId xmlns:a16="http://schemas.microsoft.com/office/drawing/2014/main" id="{EA845B80-87E9-0FFA-45A2-622EA7506F95}"/>
+              </a:ext>
+            </a:extLst>
+          </p:cNvPr>
+          <p:cNvSpPr/>
+          <p:nvPr/>
+        </p:nvSpPr>
+        <p:spPr>
+          <a:xfrm rot="18821318">
+            <a:off x="-1996633" y="1467091"/>
+            <a:ext cx="3993265" cy="3923818"/>
+          </a:xfrm>
+          <a:prstGeom prst="blockArc">
+            <a:avLst>
+              <a:gd name="adj1" fmla="val 18889740"/>
+              <a:gd name="adj2" fmla="val 0"/>
+              <a:gd name="adj3" fmla="val 25000"/>
+            </a:avLst>
+          </a:prstGeom>
+          <a:solidFill>
+            <a:srgbClr val="FFC000"/>
+          </a:solidFill>
+          <a:ln>
+            <a:noFill/>
+          </a:ln>
+        </p:spPr>
+        <p:style>
+          <a:lnRef idx="2">
+            <a:schemeClr val="accent1">
+              <a:shade val="15000"/>
+            </a:schemeClr>
+          </a:lnRef>
+          <a:fillRef idx="1">
+            <a:schemeClr val="accent1"/>
+          </a:fillRef>
+          <a:effectRef idx="0">
+            <a:schemeClr val="accent1"/>
+          </a:effectRef>
+          <a:fontRef idx="minor">
+            <a:schemeClr val="lt1"/>
+          </a:fontRef>
+        </p:style>
+        <p:txBody>
+          <a:bodyPr rtlCol="0" anchor="ctr"/>
+          <a:lstStyle/>
+          <a:p>
+            <a:pPr algn="ctr"/>
+            <a:endParaRPr lang="fr-FR">
+              <a:solidFill>
+                <a:schemeClr val="tx1"/>
+              </a:solidFill>
+            </a:endParaRPr>
+          </a:p>
+        </p:txBody>
+      </p:sp>
+      <p:pic>
+        <p:nvPicPr>
+          <p:cNvPr id="3" name="Graphique 2" descr="Livres sur une étagère avec un remplissage uni">
+            <a:extLst>
+              <a:ext uri="{FF2B5EF4-FFF2-40B4-BE49-F238E27FC236}">
+                <a16:creationId xmlns:a16="http://schemas.microsoft.com/office/drawing/2014/main" id="{3C580096-D03E-48A0-5918-7C75B9739E3C}"/>
+              </a:ext>
+            </a:extLst>
+          </p:cNvPr>
+          <p:cNvPicPr>
+            <a:picLocks noChangeAspect="1"/>
+          </p:cNvPicPr>
+          <p:nvPr/>
+        </p:nvPicPr>
+        <p:blipFill>
+          <a:blip r:embed="rId4">
+            <a:extLst>
+              <a:ext uri="{96DAC541-7B7A-43D3-8B79-37D633B846F1}">
+                <asvg:svgBlip xmlns:asvg="http://schemas.microsoft.com/office/drawing/2016/SVG/main" r:embed="rId5"/>
+              </a:ext>
+            </a:extLst>
+          </a:blip>
+          <a:stretch>
+            <a:fillRect/>
+          </a:stretch>
+        </p:blipFill>
+        <p:spPr>
+          <a:xfrm>
+            <a:off x="-1026250" y="4358105"/>
+            <a:ext cx="914400" cy="914400"/>
+          </a:xfrm>
+          <a:prstGeom prst="rect">
+            <a:avLst/>
+          </a:prstGeom>
+        </p:spPr>
+      </p:pic>
+      <p:pic>
+        <p:nvPicPr>
+          <p:cNvPr id="5" name="Graphique 4" descr="Informatique hébergé avec un remplissage uni">
+            <a:extLst>
+              <a:ext uri="{FF2B5EF4-FFF2-40B4-BE49-F238E27FC236}">
+                <a16:creationId xmlns:a16="http://schemas.microsoft.com/office/drawing/2014/main" id="{3C2F7EF3-91EC-6E85-B22E-C27287F58154}"/>
+              </a:ext>
+            </a:extLst>
+          </p:cNvPr>
+          <p:cNvPicPr>
+            <a:picLocks noChangeAspect="1"/>
+          </p:cNvPicPr>
+          <p:nvPr/>
+        </p:nvPicPr>
+        <p:blipFill>
+          <a:blip r:embed="rId6">
+            <a:extLst>
+              <a:ext uri="{96DAC541-7B7A-43D3-8B79-37D633B846F1}">
+                <asvg:svgBlip xmlns:asvg="http://schemas.microsoft.com/office/drawing/2016/SVG/main" r:embed="rId7"/>
+              </a:ext>
+            </a:extLst>
+          </a:blip>
+          <a:stretch>
+            <a:fillRect/>
+          </a:stretch>
+        </p:blipFill>
+        <p:spPr>
+          <a:xfrm>
+            <a:off x="159038" y="4358104"/>
+            <a:ext cx="914400" cy="914400"/>
+          </a:xfrm>
+          <a:prstGeom prst="rect">
+            <a:avLst/>
+          </a:prstGeom>
+        </p:spPr>
+      </p:pic>
+      <p:pic>
+        <p:nvPicPr>
+          <p:cNvPr id="7" name="Graphique 6" descr="Ordinateur avec un remplissage uni">
+            <a:extLst>
+              <a:ext uri="{FF2B5EF4-FFF2-40B4-BE49-F238E27FC236}">
+                <a16:creationId xmlns:a16="http://schemas.microsoft.com/office/drawing/2014/main" id="{C2B17D39-7372-7FF7-7D19-813274E1C082}"/>
+              </a:ext>
+            </a:extLst>
+          </p:cNvPr>
+          <p:cNvPicPr>
+            <a:picLocks noChangeAspect="1"/>
+          </p:cNvPicPr>
+          <p:nvPr/>
+        </p:nvPicPr>
+        <p:blipFill>
+          <a:blip r:embed="rId8">
+            <a:extLst>
+              <a:ext uri="{96DAC541-7B7A-43D3-8B79-37D633B846F1}">
+                <asvg:svgBlip xmlns:asvg="http://schemas.microsoft.com/office/drawing/2016/SVG/main" r:embed="rId9"/>
+              </a:ext>
+            </a:extLst>
+          </a:blip>
+          <a:stretch>
+            <a:fillRect/>
+          </a:stretch>
+        </p:blipFill>
+        <p:spPr>
+          <a:xfrm>
+            <a:off x="929358" y="2435614"/>
+            <a:ext cx="914400" cy="914400"/>
+          </a:xfrm>
+          <a:prstGeom prst="rect">
+            <a:avLst/>
+          </a:prstGeom>
+        </p:spPr>
+      </p:pic>
+      <p:pic>
+        <p:nvPicPr>
+          <p:cNvPr id="10" name="Graphique 9" descr="Enveloppe avec un remplissage uni">
+            <a:extLst>
+              <a:ext uri="{FF2B5EF4-FFF2-40B4-BE49-F238E27FC236}">
+                <a16:creationId xmlns:a16="http://schemas.microsoft.com/office/drawing/2014/main" id="{DA16F6C7-D59B-A8DE-D407-B2757D048552}"/>
+              </a:ext>
+            </a:extLst>
+          </p:cNvPr>
+          <p:cNvPicPr>
+            <a:picLocks noChangeAspect="1"/>
+          </p:cNvPicPr>
+          <p:nvPr/>
+        </p:nvPicPr>
+        <p:blipFill>
+          <a:blip r:embed="rId10">
+            <a:extLst>
+              <a:ext uri="{96DAC541-7B7A-43D3-8B79-37D633B846F1}">
+                <asvg:svgBlip xmlns:asvg="http://schemas.microsoft.com/office/drawing/2016/SVG/main" r:embed="rId11"/>
+              </a:ext>
+            </a:extLst>
+          </a:blip>
+          <a:stretch>
+            <a:fillRect/>
+          </a:stretch>
+        </p:blipFill>
+        <p:spPr>
+          <a:xfrm>
+            <a:off x="929358" y="3488202"/>
+            <a:ext cx="914400" cy="914400"/>
+          </a:xfrm>
+          <a:prstGeom prst="rect">
+            <a:avLst/>
+          </a:prstGeom>
+        </p:spPr>
+      </p:pic>
+      <p:pic>
+        <p:nvPicPr>
+          <p:cNvPr id="6" name="Graphique 5" descr="Personne confuse avec un remplissage uni">
+            <a:extLst>
+              <a:ext uri="{FF2B5EF4-FFF2-40B4-BE49-F238E27FC236}">
+                <a16:creationId xmlns:a16="http://schemas.microsoft.com/office/drawing/2014/main" id="{609357A1-C109-D84E-7BFC-B5128843786E}"/>
+              </a:ext>
+            </a:extLst>
+          </p:cNvPr>
+          <p:cNvPicPr>
+            <a:picLocks noChangeAspect="1"/>
+          </p:cNvPicPr>
+          <p:nvPr/>
+        </p:nvPicPr>
+        <p:blipFill>
+          <a:blip r:embed="rId12">
+            <a:extLst>
+              <a:ext uri="{96DAC541-7B7A-43D3-8B79-37D633B846F1}">
+                <asvg:svgBlip xmlns:asvg="http://schemas.microsoft.com/office/drawing/2016/SVG/main" r:embed="rId13"/>
+              </a:ext>
+            </a:extLst>
+          </a:blip>
+          <a:stretch>
+            <a:fillRect/>
+          </a:stretch>
+        </p:blipFill>
+        <p:spPr>
+          <a:xfrm rot="10800000">
+            <a:off x="-1965768" y="2928395"/>
+            <a:ext cx="914400" cy="914400"/>
+          </a:xfrm>
+          <a:prstGeom prst="rect">
+            <a:avLst/>
+          </a:prstGeom>
+        </p:spPr>
+      </p:pic>
+      <p:pic>
+        <p:nvPicPr>
+          <p:cNvPr id="4" name="Image 3">
+            <a:extLst>
+              <a:ext uri="{FF2B5EF4-FFF2-40B4-BE49-F238E27FC236}">
+                <a16:creationId xmlns:a16="http://schemas.microsoft.com/office/drawing/2014/main" id="{604F593A-218F-10D5-A0B3-187CA2BA6432}"/>
+              </a:ext>
+            </a:extLst>
+          </p:cNvPr>
+          <p:cNvPicPr>
+            <a:picLocks noChangeAspect="1"/>
+          </p:cNvPicPr>
+          <p:nvPr/>
+        </p:nvPicPr>
+        <p:blipFill>
+          <a:blip r:embed="rId14"/>
+          <a:srcRect r="-134" b="5652"/>
+          <a:stretch>
+            <a:fillRect/>
+          </a:stretch>
+        </p:blipFill>
+        <p:spPr>
+          <a:xfrm>
+            <a:off x="4458313" y="-6858000"/>
+            <a:ext cx="3275371" cy="6858000"/>
+          </a:xfrm>
+          <a:prstGeom prst="rect">
+            <a:avLst/>
+          </a:prstGeom>
+        </p:spPr>
+      </p:pic>
+      <p:sp>
+        <p:nvSpPr>
+          <p:cNvPr id="9" name="ZoneTexte 8">
+            <a:extLst>
+              <a:ext uri="{FF2B5EF4-FFF2-40B4-BE49-F238E27FC236}">
+                <a16:creationId xmlns:a16="http://schemas.microsoft.com/office/drawing/2014/main" id="{A20C6FED-3B5E-FCC5-1878-26CE592D8546}"/>
+              </a:ext>
+            </a:extLst>
+          </p:cNvPr>
+          <p:cNvSpPr txBox="1"/>
+          <p:nvPr/>
+        </p:nvSpPr>
+        <p:spPr>
+          <a:xfrm>
+            <a:off x="7733684" y="-6858000"/>
+            <a:ext cx="3376819" cy="769441"/>
+          </a:xfrm>
+          <a:prstGeom prst="rect">
+            <a:avLst/>
+          </a:prstGeom>
+          <a:noFill/>
+        </p:spPr>
+        <p:txBody>
+          <a:bodyPr wrap="square" rtlCol="0">
+            <a:spAutoFit/>
+          </a:bodyPr>
+          <a:lstStyle/>
+          <a:p>
+            <a:r>
+              <a:rPr lang="fr-FR" sz="4400" dirty="0">
+                <a:latin typeface="Pristina" panose="03060402040406080204" pitchFamily="66" charset="0"/>
+              </a:rPr>
+              <a:t>Upload d’images</a:t>
+            </a:r>
+          </a:p>
+        </p:txBody>
+      </p:sp>
+      <p:sp>
+        <p:nvSpPr>
+          <p:cNvPr id="12" name="ZoneTexte 11">
+            <a:extLst>
+              <a:ext uri="{FF2B5EF4-FFF2-40B4-BE49-F238E27FC236}">
+                <a16:creationId xmlns:a16="http://schemas.microsoft.com/office/drawing/2014/main" id="{E7973458-237E-4580-9EA2-922FACBE9252}"/>
+              </a:ext>
+            </a:extLst>
+          </p:cNvPr>
+          <p:cNvSpPr txBox="1"/>
+          <p:nvPr/>
+        </p:nvSpPr>
+        <p:spPr>
+          <a:xfrm>
+            <a:off x="9422093" y="-3267692"/>
+            <a:ext cx="2318263" cy="1446550"/>
+          </a:xfrm>
+          <a:prstGeom prst="rect">
+            <a:avLst/>
+          </a:prstGeom>
+          <a:noFill/>
+        </p:spPr>
+        <p:txBody>
+          <a:bodyPr wrap="none" rtlCol="0">
+            <a:spAutoFit/>
+          </a:bodyPr>
+          <a:lstStyle/>
+          <a:p>
+            <a:pPr marL="285750" indent="-285750">
+              <a:buFontTx/>
+              <a:buChar char="-"/>
+            </a:pPr>
+            <a:r>
+              <a:rPr lang="fr-FR" sz="4400" dirty="0">
+                <a:latin typeface="Pristina" panose="03060402040406080204" pitchFamily="66" charset="0"/>
+              </a:rPr>
+              <a:t>Bouton de</a:t>
+            </a:r>
+          </a:p>
+          <a:p>
+            <a:r>
+              <a:rPr lang="fr-FR" sz="4400" dirty="0">
+                <a:latin typeface="Pristina" panose="03060402040406080204" pitchFamily="66" charset="0"/>
+              </a:rPr>
+              <a:t>déconnexion</a:t>
+            </a:r>
+          </a:p>
+        </p:txBody>
+      </p:sp>
+      <p:sp>
+        <p:nvSpPr>
+          <p:cNvPr id="13" name="ZoneTexte 12">
+            <a:extLst>
+              <a:ext uri="{FF2B5EF4-FFF2-40B4-BE49-F238E27FC236}">
+                <a16:creationId xmlns:a16="http://schemas.microsoft.com/office/drawing/2014/main" id="{DD64B43C-C5C1-2FD5-85FF-50CA98B5263F}"/>
+              </a:ext>
+            </a:extLst>
+          </p:cNvPr>
+          <p:cNvSpPr txBox="1"/>
+          <p:nvPr/>
+        </p:nvSpPr>
+        <p:spPr>
+          <a:xfrm rot="3932945">
+            <a:off x="10897064" y="3044279"/>
+            <a:ext cx="6304010" cy="769441"/>
+          </a:xfrm>
+          <a:prstGeom prst="rect">
+            <a:avLst/>
+          </a:prstGeom>
+          <a:noFill/>
+        </p:spPr>
+        <p:txBody>
+          <a:bodyPr wrap="square" rtlCol="0">
+            <a:spAutoFit/>
+          </a:bodyPr>
+          <a:lstStyle/>
+          <a:p>
+            <a:r>
+              <a:rPr lang="fr-FR" sz="4400" dirty="0">
+                <a:latin typeface="Symbol" panose="05050102010706020507" pitchFamily="18" charset="2"/>
+              </a:rPr>
+              <a:t>Diagrammes utilisés</a:t>
+            </a:r>
+          </a:p>
+        </p:txBody>
+      </p:sp>
+      <p:sp>
+        <p:nvSpPr>
+          <p:cNvPr id="8" name="ZoneTexte 7">
+            <a:extLst>
+              <a:ext uri="{FF2B5EF4-FFF2-40B4-BE49-F238E27FC236}">
+                <a16:creationId xmlns:a16="http://schemas.microsoft.com/office/drawing/2014/main" id="{A4BB2444-754A-1527-E453-9EA339A8D795}"/>
+              </a:ext>
+            </a:extLst>
+          </p:cNvPr>
+          <p:cNvSpPr txBox="1"/>
+          <p:nvPr/>
+        </p:nvSpPr>
+        <p:spPr>
+          <a:xfrm>
+            <a:off x="1843758" y="6853949"/>
+            <a:ext cx="6304010" cy="1446550"/>
+          </a:xfrm>
+          <a:prstGeom prst="rect">
+            <a:avLst/>
+          </a:prstGeom>
+          <a:noFill/>
+        </p:spPr>
+        <p:txBody>
+          <a:bodyPr wrap="square" rtlCol="0">
+            <a:spAutoFit/>
+          </a:bodyPr>
+          <a:lstStyle/>
+          <a:p>
+            <a:r>
+              <a:rPr lang="fr-FR" sz="4400" dirty="0">
+                <a:latin typeface="Snap ITC" panose="04040A07060A02020202" pitchFamily="82" charset="0"/>
+              </a:rPr>
+              <a:t>Diagrammes utilisés</a:t>
+            </a:r>
+          </a:p>
+        </p:txBody>
+      </p:sp>
+      <p:pic>
+        <p:nvPicPr>
+          <p:cNvPr id="11" name="Image 10">
+            <a:extLst>
+              <a:ext uri="{FF2B5EF4-FFF2-40B4-BE49-F238E27FC236}">
+                <a16:creationId xmlns:a16="http://schemas.microsoft.com/office/drawing/2014/main" id="{F7DD61CE-24BD-D50F-305E-48DE173FD404}"/>
+              </a:ext>
+            </a:extLst>
+          </p:cNvPr>
+          <p:cNvPicPr>
+            <a:picLocks noChangeAspect="1"/>
+          </p:cNvPicPr>
+          <p:nvPr/>
+        </p:nvPicPr>
+        <p:blipFill>
+          <a:blip r:embed="rId15"/>
+          <a:stretch>
+            <a:fillRect/>
+          </a:stretch>
+        </p:blipFill>
+        <p:spPr>
+          <a:xfrm>
+            <a:off x="13335476" y="-121599"/>
+            <a:ext cx="6044612" cy="7014386"/>
+          </a:xfrm>
+          <a:prstGeom prst="rect">
+            <a:avLst/>
+          </a:prstGeom>
+        </p:spPr>
+      </p:pic>
+      <p:pic>
+        <p:nvPicPr>
+          <p:cNvPr id="15" name="Graphique 14" descr="Cerveau dans une tête avec un remplissage uni">
+            <a:extLst>
+              <a:ext uri="{FF2B5EF4-FFF2-40B4-BE49-F238E27FC236}">
+                <a16:creationId xmlns:a16="http://schemas.microsoft.com/office/drawing/2014/main" id="{B1DB0700-8ACF-F48F-DA80-C2FCBE20BE9A}"/>
+              </a:ext>
+            </a:extLst>
+          </p:cNvPr>
+          <p:cNvPicPr>
+            <a:picLocks noChangeAspect="1"/>
+          </p:cNvPicPr>
+          <p:nvPr/>
+        </p:nvPicPr>
+        <p:blipFill>
+          <a:blip r:embed="rId16">
+            <a:extLst>
+              <a:ext uri="{96DAC541-7B7A-43D3-8B79-37D633B846F1}">
+                <asvg:svgBlip xmlns:asvg="http://schemas.microsoft.com/office/drawing/2016/SVG/main" r:embed="rId17"/>
+              </a:ext>
+            </a:extLst>
+          </a:blip>
+          <a:stretch>
+            <a:fillRect/>
+          </a:stretch>
+        </p:blipFill>
+        <p:spPr>
+          <a:xfrm>
+            <a:off x="14958" y="1585496"/>
+            <a:ext cx="914400" cy="914400"/>
+          </a:xfrm>
+          <a:prstGeom prst="rect">
+            <a:avLst/>
+          </a:prstGeom>
+        </p:spPr>
+      </p:pic>
+      <p:sp>
+        <p:nvSpPr>
+          <p:cNvPr id="18" name="ZoneTexte 17">
+            <a:extLst>
+              <a:ext uri="{FF2B5EF4-FFF2-40B4-BE49-F238E27FC236}">
+                <a16:creationId xmlns:a16="http://schemas.microsoft.com/office/drawing/2014/main" id="{626EDA7D-90E2-307A-9C33-D3018CE30325}"/>
+              </a:ext>
+            </a:extLst>
+          </p:cNvPr>
+          <p:cNvSpPr txBox="1"/>
+          <p:nvPr/>
+        </p:nvSpPr>
+        <p:spPr>
+          <a:xfrm>
+            <a:off x="2945936" y="15716"/>
+            <a:ext cx="6300123" cy="769441"/>
+          </a:xfrm>
+          <a:prstGeom prst="rect">
+            <a:avLst/>
+          </a:prstGeom>
+          <a:noFill/>
+        </p:spPr>
+        <p:txBody>
+          <a:bodyPr wrap="none" rtlCol="0">
+            <a:spAutoFit/>
+          </a:bodyPr>
+          <a:lstStyle/>
+          <a:p>
+            <a:r>
+              <a:rPr lang="fr-FR" sz="4400" dirty="0">
+                <a:latin typeface="Algerian" panose="04020705040A02060702" pitchFamily="82" charset="0"/>
+              </a:rPr>
+              <a:t>Les différents rôles</a:t>
+            </a:r>
+          </a:p>
+        </p:txBody>
+      </p:sp>
+      <p:pic>
+        <p:nvPicPr>
+          <p:cNvPr id="20" name="Image 19">
+            <a:extLst>
+              <a:ext uri="{FF2B5EF4-FFF2-40B4-BE49-F238E27FC236}">
+                <a16:creationId xmlns:a16="http://schemas.microsoft.com/office/drawing/2014/main" id="{4C218368-247A-3DBD-402C-0923A3623AF9}"/>
+              </a:ext>
+            </a:extLst>
+          </p:cNvPr>
+          <p:cNvPicPr>
+            <a:picLocks noChangeAspect="1"/>
+          </p:cNvPicPr>
+          <p:nvPr/>
+        </p:nvPicPr>
+        <p:blipFill>
+          <a:blip r:embed="rId18"/>
+          <a:stretch>
+            <a:fillRect/>
+          </a:stretch>
+        </p:blipFill>
+        <p:spPr>
+          <a:xfrm>
+            <a:off x="3599002" y="3310596"/>
+            <a:ext cx="4462796" cy="1259304"/>
+          </a:xfrm>
+          <a:prstGeom prst="rect">
+            <a:avLst/>
+          </a:prstGeom>
+        </p:spPr>
+      </p:pic>
+      <p:pic>
+        <p:nvPicPr>
+          <p:cNvPr id="22" name="Image 21">
+            <a:extLst>
+              <a:ext uri="{FF2B5EF4-FFF2-40B4-BE49-F238E27FC236}">
+                <a16:creationId xmlns:a16="http://schemas.microsoft.com/office/drawing/2014/main" id="{FF1E95F9-E673-304B-57E6-EAC6AEB239AE}"/>
+              </a:ext>
+            </a:extLst>
+          </p:cNvPr>
+          <p:cNvPicPr>
+            <a:picLocks noChangeAspect="1"/>
+          </p:cNvPicPr>
+          <p:nvPr/>
+        </p:nvPicPr>
+        <p:blipFill>
+          <a:blip r:embed="rId19"/>
+          <a:stretch>
+            <a:fillRect/>
+          </a:stretch>
+        </p:blipFill>
+        <p:spPr>
+          <a:xfrm>
+            <a:off x="3599002" y="1206184"/>
+            <a:ext cx="4462796" cy="2113956"/>
+          </a:xfrm>
+          <a:prstGeom prst="rect">
+            <a:avLst/>
+          </a:prstGeom>
+        </p:spPr>
+      </p:pic>
+    </p:spTree>
+    <p:extLst>
+      <p:ext uri="{BB962C8B-B14F-4D97-AF65-F5344CB8AC3E}">
+        <p14:creationId xmlns:p14="http://schemas.microsoft.com/office/powerpoint/2010/main" val="1999730121"/>
+      </p:ext>
+    </p:extLst>
+  </p:cSld>
+  <p:clrMapOvr>
+    <a:masterClrMapping/>
+  </p:clrMapOvr>
+  <mc:AlternateContent xmlns:mc="http://schemas.openxmlformats.org/markup-compatibility/2006">
+    <mc:Choice xmlns:p159="http://schemas.microsoft.com/office/powerpoint/2015/09/main" Requires="p159">
+      <p:transition xmlns:p14="http://schemas.microsoft.com/office/powerpoint/2010/main" spd="slow" p14:dur="2000">
+        <p159:morph option="byObject"/>
+      </p:transition>
+    </mc:Choice>
+    <mc:Fallback>
+      <p:transition spd="slow">
+        <p:fade/>
+      </p:transition>
+    </mc:Fallback>
+  </mc:AlternateContent>
+</p:sld>
+</file>
+
+<file path=ppt/slides/slide26.xml><?xml version="1.0" encoding="utf-8"?>
 <p:sld xmlns:a="http://schemas.openxmlformats.org/drawingml/2006/main" xmlns:r="http://schemas.openxmlformats.org/officeDocument/2006/relationships" xmlns:p="http://schemas.openxmlformats.org/presentationml/2006/main">
   <p:cSld>
     <p:spTree>
@@ -17083,12 +19694,126 @@
           </a:prstGeom>
         </p:spPr>
       </p:pic>
+      <p:sp>
+        <p:nvSpPr>
+          <p:cNvPr id="2" name="ZoneTexte 1">
+            <a:extLst>
+              <a:ext uri="{FF2B5EF4-FFF2-40B4-BE49-F238E27FC236}">
+                <a16:creationId xmlns:a16="http://schemas.microsoft.com/office/drawing/2014/main" id="{2115CCA1-35D9-862F-8D22-6B505A6A707C}"/>
+              </a:ext>
+            </a:extLst>
+          </p:cNvPr>
+          <p:cNvSpPr txBox="1"/>
+          <p:nvPr/>
+        </p:nvSpPr>
+        <p:spPr>
+          <a:xfrm>
+            <a:off x="3031507" y="0"/>
+            <a:ext cx="6128985" cy="1015663"/>
+          </a:xfrm>
+          <a:prstGeom prst="rect">
+            <a:avLst/>
+          </a:prstGeom>
+          <a:noFill/>
+        </p:spPr>
+        <p:txBody>
+          <a:bodyPr wrap="square" rtlCol="0">
+            <a:spAutoFit/>
+          </a:bodyPr>
+          <a:lstStyle/>
+          <a:p>
+            <a:r>
+              <a:rPr lang="fr-FR" sz="6000" dirty="0">
+                <a:latin typeface="Brush Script MT" panose="03060802040406070304" pitchFamily="66" charset="0"/>
+              </a:rPr>
+              <a:t>Merci de votre attention</a:t>
+            </a:r>
+          </a:p>
+        </p:txBody>
+      </p:sp>
+      <p:sp>
+        <p:nvSpPr>
+          <p:cNvPr id="14" name="Cercle : creux 13">
+            <a:extLst>
+              <a:ext uri="{FF2B5EF4-FFF2-40B4-BE49-F238E27FC236}">
+                <a16:creationId xmlns:a16="http://schemas.microsoft.com/office/drawing/2014/main" id="{748F675C-D9EC-12BA-A82C-06325CF0A217}"/>
+              </a:ext>
+            </a:extLst>
+          </p:cNvPr>
+          <p:cNvSpPr/>
+          <p:nvPr/>
+        </p:nvSpPr>
+        <p:spPr>
+          <a:xfrm rot="10800000">
+            <a:off x="-1996633" y="1467091"/>
+            <a:ext cx="3993265" cy="3923818"/>
+          </a:xfrm>
+          <a:prstGeom prst="donut">
+            <a:avLst/>
+          </a:prstGeom>
+          <a:gradFill flip="none" rotWithShape="1">
+            <a:gsLst>
+              <a:gs pos="0">
+                <a:srgbClr val="7030A0">
+                  <a:shade val="30000"/>
+                  <a:satMod val="115000"/>
+                </a:srgbClr>
+              </a:gs>
+              <a:gs pos="50000">
+                <a:srgbClr val="7030A0">
+                  <a:shade val="67500"/>
+                  <a:satMod val="115000"/>
+                </a:srgbClr>
+              </a:gs>
+              <a:gs pos="100000">
+                <a:srgbClr val="7030A0">
+                  <a:shade val="100000"/>
+                  <a:satMod val="115000"/>
+                </a:srgbClr>
+              </a:gs>
+            </a:gsLst>
+            <a:lin ang="10800000" scaled="1"/>
+            <a:tileRect/>
+          </a:gradFill>
+          <a:ln>
+            <a:noFill/>
+          </a:ln>
+        </p:spPr>
+        <p:style>
+          <a:lnRef idx="2">
+            <a:schemeClr val="accent1">
+              <a:shade val="15000"/>
+            </a:schemeClr>
+          </a:lnRef>
+          <a:fillRef idx="1">
+            <a:schemeClr val="accent1"/>
+          </a:fillRef>
+          <a:effectRef idx="0">
+            <a:schemeClr val="accent1"/>
+          </a:effectRef>
+          <a:fontRef idx="minor">
+            <a:schemeClr val="lt1"/>
+          </a:fontRef>
+        </p:style>
+        <p:txBody>
+          <a:bodyPr rtlCol="0" anchor="ctr"/>
+          <a:lstStyle/>
+          <a:p>
+            <a:pPr algn="ctr"/>
+            <a:endParaRPr lang="fr-FR">
+              <a:solidFill>
+                <a:schemeClr val="tx1"/>
+              </a:solidFill>
+            </a:endParaRPr>
+          </a:p>
+        </p:txBody>
+      </p:sp>
       <p:pic>
         <p:nvPicPr>
-          <p:cNvPr id="8" name="Image 7">
-            <a:extLst>
-              <a:ext uri="{FF2B5EF4-FFF2-40B4-BE49-F238E27FC236}">
-                <a16:creationId xmlns:a16="http://schemas.microsoft.com/office/drawing/2014/main" id="{00F2A76D-0C89-9C75-477F-60354D252AE0}"/>
+          <p:cNvPr id="3" name="Graphique 2" descr="Livres sur une étagère avec un remplissage uni">
+            <a:extLst>
+              <a:ext uri="{FF2B5EF4-FFF2-40B4-BE49-F238E27FC236}">
+                <a16:creationId xmlns:a16="http://schemas.microsoft.com/office/drawing/2014/main" id="{0E424B50-B67B-2FF8-F245-4331AAD43DE9}"/>
               </a:ext>
             </a:extLst>
           </p:cNvPr>
@@ -17098,27 +19823,141 @@
           <p:nvPr/>
         </p:nvPicPr>
         <p:blipFill>
-          <a:blip r:embed="rId2"/>
+          <a:blip r:embed="rId3">
+            <a:extLst>
+              <a:ext uri="{96DAC541-7B7A-43D3-8B79-37D633B846F1}">
+                <asvg:svgBlip xmlns:asvg="http://schemas.microsoft.com/office/drawing/2016/SVG/main" r:embed="rId4"/>
+              </a:ext>
+            </a:extLst>
+          </a:blip>
           <a:stretch>
             <a:fillRect/>
           </a:stretch>
         </p:blipFill>
         <p:spPr>
-          <a:xfrm>
-            <a:off x="11169" y="7740445"/>
-            <a:ext cx="12180831" cy="5093110"/>
+          <a:xfrm rot="10800000">
+            <a:off x="-1074715" y="1632155"/>
+            <a:ext cx="914400" cy="914400"/>
           </a:xfrm>
           <a:prstGeom prst="rect">
             <a:avLst/>
           </a:prstGeom>
         </p:spPr>
       </p:pic>
-      <p:sp>
-        <p:nvSpPr>
-          <p:cNvPr id="11" name="Forme libre : forme 10">
-            <a:extLst>
-              <a:ext uri="{FF2B5EF4-FFF2-40B4-BE49-F238E27FC236}">
-                <a16:creationId xmlns:a16="http://schemas.microsoft.com/office/drawing/2014/main" id="{5884A06F-3698-AB95-E3C3-D947467DAD64}"/>
+      <p:pic>
+        <p:nvPicPr>
+          <p:cNvPr id="5" name="Graphique 4" descr="Informatique hébergé avec un remplissage uni">
+            <a:extLst>
+              <a:ext uri="{FF2B5EF4-FFF2-40B4-BE49-F238E27FC236}">
+                <a16:creationId xmlns:a16="http://schemas.microsoft.com/office/drawing/2014/main" id="{491B6968-6E44-A084-6CDE-942136968EC4}"/>
+              </a:ext>
+            </a:extLst>
+          </p:cNvPr>
+          <p:cNvPicPr>
+            <a:picLocks noChangeAspect="1"/>
+          </p:cNvPicPr>
+          <p:nvPr/>
+        </p:nvPicPr>
+        <p:blipFill>
+          <a:blip r:embed="rId5">
+            <a:extLst>
+              <a:ext uri="{96DAC541-7B7A-43D3-8B79-37D633B846F1}">
+                <asvg:svgBlip xmlns:asvg="http://schemas.microsoft.com/office/drawing/2016/SVG/main" r:embed="rId6"/>
+              </a:ext>
+            </a:extLst>
+          </a:blip>
+          <a:stretch>
+            <a:fillRect/>
+          </a:stretch>
+        </p:blipFill>
+        <p:spPr>
+          <a:xfrm rot="10800000">
+            <a:off x="-1876079" y="2514600"/>
+            <a:ext cx="914400" cy="914400"/>
+          </a:xfrm>
+          <a:prstGeom prst="rect">
+            <a:avLst/>
+          </a:prstGeom>
+        </p:spPr>
+      </p:pic>
+      <p:pic>
+        <p:nvPicPr>
+          <p:cNvPr id="7" name="Graphique 6" descr="Ordinateur avec un remplissage uni">
+            <a:extLst>
+              <a:ext uri="{FF2B5EF4-FFF2-40B4-BE49-F238E27FC236}">
+                <a16:creationId xmlns:a16="http://schemas.microsoft.com/office/drawing/2014/main" id="{7673EC41-6609-FE70-E929-3688216FF592}"/>
+              </a:ext>
+            </a:extLst>
+          </p:cNvPr>
+          <p:cNvPicPr>
+            <a:picLocks noChangeAspect="1"/>
+          </p:cNvPicPr>
+          <p:nvPr/>
+        </p:nvPicPr>
+        <p:blipFill>
+          <a:blip r:embed="rId7">
+            <a:extLst>
+              <a:ext uri="{96DAC541-7B7A-43D3-8B79-37D633B846F1}">
+                <asvg:svgBlip xmlns:asvg="http://schemas.microsoft.com/office/drawing/2016/SVG/main" r:embed="rId8"/>
+              </a:ext>
+            </a:extLst>
+          </a:blip>
+          <a:stretch>
+            <a:fillRect/>
+          </a:stretch>
+        </p:blipFill>
+        <p:spPr>
+          <a:xfrm rot="10800000">
+            <a:off x="-929359" y="4358104"/>
+            <a:ext cx="914400" cy="914400"/>
+          </a:xfrm>
+          <a:prstGeom prst="rect">
+            <a:avLst/>
+          </a:prstGeom>
+        </p:spPr>
+      </p:pic>
+      <p:pic>
+        <p:nvPicPr>
+          <p:cNvPr id="10" name="Graphique 9" descr="Enveloppe avec un remplissage uni">
+            <a:extLst>
+              <a:ext uri="{FF2B5EF4-FFF2-40B4-BE49-F238E27FC236}">
+                <a16:creationId xmlns:a16="http://schemas.microsoft.com/office/drawing/2014/main" id="{2E473E79-324E-DC67-68FA-D9A52D0F78F9}"/>
+              </a:ext>
+            </a:extLst>
+          </p:cNvPr>
+          <p:cNvPicPr>
+            <a:picLocks noChangeAspect="1"/>
+          </p:cNvPicPr>
+          <p:nvPr/>
+        </p:nvPicPr>
+        <p:blipFill>
+          <a:blip r:embed="rId9">
+            <a:extLst>
+              <a:ext uri="{96DAC541-7B7A-43D3-8B79-37D633B846F1}">
+                <asvg:svgBlip xmlns:asvg="http://schemas.microsoft.com/office/drawing/2016/SVG/main" r:embed="rId10"/>
+              </a:ext>
+            </a:extLst>
+          </a:blip>
+          <a:stretch>
+            <a:fillRect/>
+          </a:stretch>
+        </p:blipFill>
+        <p:spPr>
+          <a:xfrm rot="10800000">
+            <a:off x="-1843759" y="3585912"/>
+            <a:ext cx="914400" cy="914400"/>
+          </a:xfrm>
+          <a:prstGeom prst="rect">
+            <a:avLst/>
+          </a:prstGeom>
+        </p:spPr>
+      </p:pic>
+      <p:sp>
+        <p:nvSpPr>
+          <p:cNvPr id="16" name="Arc plein 15">
+            <a:extLst>
+              <a:ext uri="{FF2B5EF4-FFF2-40B4-BE49-F238E27FC236}">
+                <a16:creationId xmlns:a16="http://schemas.microsoft.com/office/drawing/2014/main" id="{02B8F96F-FD51-BE76-6FED-6D5B35B1DB5A}"/>
               </a:ext>
             </a:extLst>
           </p:cNvPr>
@@ -17126,9 +19965,105 @@
           <p:nvPr/>
         </p:nvSpPr>
         <p:spPr>
-          <a:xfrm>
-            <a:off x="0" y="6858000"/>
-            <a:ext cx="12192000" cy="6858000"/>
+          <a:xfrm rot="1324638">
+            <a:off x="-1996633" y="1467091"/>
+            <a:ext cx="3993265" cy="3923818"/>
+          </a:xfrm>
+          <a:prstGeom prst="blockArc">
+            <a:avLst>
+              <a:gd name="adj1" fmla="val 18889740"/>
+              <a:gd name="adj2" fmla="val 0"/>
+              <a:gd name="adj3" fmla="val 25000"/>
+            </a:avLst>
+          </a:prstGeom>
+          <a:solidFill>
+            <a:srgbClr val="FFC000"/>
+          </a:solidFill>
+          <a:ln>
+            <a:noFill/>
+          </a:ln>
+        </p:spPr>
+        <p:style>
+          <a:lnRef idx="2">
+            <a:schemeClr val="accent1">
+              <a:shade val="15000"/>
+            </a:schemeClr>
+          </a:lnRef>
+          <a:fillRef idx="1">
+            <a:schemeClr val="accent1"/>
+          </a:fillRef>
+          <a:effectRef idx="0">
+            <a:schemeClr val="accent1"/>
+          </a:effectRef>
+          <a:fontRef idx="minor">
+            <a:schemeClr val="lt1"/>
+          </a:fontRef>
+        </p:style>
+        <p:txBody>
+          <a:bodyPr rtlCol="0" anchor="ctr"/>
+          <a:lstStyle/>
+          <a:p>
+            <a:pPr algn="ctr"/>
+            <a:endParaRPr lang="fr-FR">
+              <a:solidFill>
+                <a:schemeClr val="tx1"/>
+              </a:solidFill>
+            </a:endParaRPr>
+          </a:p>
+        </p:txBody>
+      </p:sp>
+      <p:pic>
+        <p:nvPicPr>
+          <p:cNvPr id="6" name="Graphique 5" descr="Personne confuse avec un remplissage uni">
+            <a:extLst>
+              <a:ext uri="{FF2B5EF4-FFF2-40B4-BE49-F238E27FC236}">
+                <a16:creationId xmlns:a16="http://schemas.microsoft.com/office/drawing/2014/main" id="{3174C681-7805-4B03-0B99-1357EBA31E4F}"/>
+              </a:ext>
+            </a:extLst>
+          </p:cNvPr>
+          <p:cNvPicPr>
+            <a:picLocks noChangeAspect="1"/>
+          </p:cNvPicPr>
+          <p:nvPr/>
+        </p:nvPicPr>
+        <p:blipFill>
+          <a:blip r:embed="rId11">
+            <a:extLst>
+              <a:ext uri="{96DAC541-7B7A-43D3-8B79-37D633B846F1}">
+                <asvg:svgBlip xmlns:asvg="http://schemas.microsoft.com/office/drawing/2016/SVG/main" r:embed="rId12"/>
+              </a:ext>
+            </a:extLst>
+          </a:blip>
+          <a:stretch>
+            <a:fillRect/>
+          </a:stretch>
+        </p:blipFill>
+        <p:spPr>
+          <a:xfrm>
+            <a:off x="1051367" y="3015205"/>
+            <a:ext cx="914400" cy="914400"/>
+          </a:xfrm>
+          <a:prstGeom prst="rect">
+            <a:avLst/>
+          </a:prstGeom>
+        </p:spPr>
+      </p:pic>
+      <p:sp>
+        <p:nvSpPr>
+          <p:cNvPr id="4" name="Forme libre : forme 3">
+            <a:extLst>
+              <a:ext uri="{FF2B5EF4-FFF2-40B4-BE49-F238E27FC236}">
+                <a16:creationId xmlns:a16="http://schemas.microsoft.com/office/drawing/2014/main" id="{D529A252-D11D-999B-0AD0-D19DEE9C99ED}"/>
+              </a:ext>
+            </a:extLst>
+          </p:cNvPr>
+          <p:cNvSpPr/>
+          <p:nvPr/>
+        </p:nvSpPr>
+        <p:spPr>
+          <a:xfrm>
+            <a:off x="2708187" y="1497035"/>
+            <a:ext cx="9483813" cy="5360965"/>
           </a:xfrm>
           <a:custGeom>
             <a:avLst/>
@@ -17424,705 +20359,6 @@
               </a:path>
             </a:pathLst>
           </a:custGeom>
-          <a:solidFill>
-            <a:schemeClr val="tx1"/>
-          </a:solidFill>
-          <a:ln>
-            <a:noFill/>
-          </a:ln>
-        </p:spPr>
-        <p:style>
-          <a:lnRef idx="2">
-            <a:schemeClr val="accent1">
-              <a:shade val="15000"/>
-            </a:schemeClr>
-          </a:lnRef>
-          <a:fillRef idx="1">
-            <a:schemeClr val="accent1"/>
-          </a:fillRef>
-          <a:effectRef idx="0">
-            <a:schemeClr val="accent1"/>
-          </a:effectRef>
-          <a:fontRef idx="minor">
-            <a:schemeClr val="lt1"/>
-          </a:fontRef>
-        </p:style>
-        <p:txBody>
-          <a:bodyPr wrap="square" rtlCol="0" anchor="ctr">
-            <a:noAutofit/>
-          </a:bodyPr>
-          <a:lstStyle/>
-          <a:p>
-            <a:pPr algn="ctr"/>
-            <a:endParaRPr lang="fr-FR" dirty="0"/>
-          </a:p>
-        </p:txBody>
-      </p:sp>
-      <p:sp>
-        <p:nvSpPr>
-          <p:cNvPr id="2" name="ZoneTexte 1">
-            <a:extLst>
-              <a:ext uri="{FF2B5EF4-FFF2-40B4-BE49-F238E27FC236}">
-                <a16:creationId xmlns:a16="http://schemas.microsoft.com/office/drawing/2014/main" id="{2115CCA1-35D9-862F-8D22-6B505A6A707C}"/>
-              </a:ext>
-            </a:extLst>
-          </p:cNvPr>
-          <p:cNvSpPr txBox="1"/>
-          <p:nvPr/>
-        </p:nvSpPr>
-        <p:spPr>
-          <a:xfrm>
-            <a:off x="3031507" y="0"/>
-            <a:ext cx="6128985" cy="1015663"/>
-          </a:xfrm>
-          <a:prstGeom prst="rect">
-            <a:avLst/>
-          </a:prstGeom>
-          <a:noFill/>
-        </p:spPr>
-        <p:txBody>
-          <a:bodyPr wrap="square" rtlCol="0">
-            <a:spAutoFit/>
-          </a:bodyPr>
-          <a:lstStyle/>
-          <a:p>
-            <a:r>
-              <a:rPr lang="fr-FR" sz="6000" dirty="0">
-                <a:latin typeface="Brush Script MT" panose="03060802040406070304" pitchFamily="66" charset="0"/>
-              </a:rPr>
-              <a:t>Merci de votre attention</a:t>
-            </a:r>
-          </a:p>
-        </p:txBody>
-      </p:sp>
-      <p:sp>
-        <p:nvSpPr>
-          <p:cNvPr id="14" name="Cercle : creux 13">
-            <a:extLst>
-              <a:ext uri="{FF2B5EF4-FFF2-40B4-BE49-F238E27FC236}">
-                <a16:creationId xmlns:a16="http://schemas.microsoft.com/office/drawing/2014/main" id="{748F675C-D9EC-12BA-A82C-06325CF0A217}"/>
-              </a:ext>
-            </a:extLst>
-          </p:cNvPr>
-          <p:cNvSpPr/>
-          <p:nvPr/>
-        </p:nvSpPr>
-        <p:spPr>
-          <a:xfrm rot="10800000">
-            <a:off x="-1996633" y="1467091"/>
-            <a:ext cx="3993265" cy="3923818"/>
-          </a:xfrm>
-          <a:prstGeom prst="donut">
-            <a:avLst/>
-          </a:prstGeom>
-          <a:gradFill flip="none" rotWithShape="1">
-            <a:gsLst>
-              <a:gs pos="0">
-                <a:srgbClr val="7030A0">
-                  <a:shade val="30000"/>
-                  <a:satMod val="115000"/>
-                </a:srgbClr>
-              </a:gs>
-              <a:gs pos="50000">
-                <a:srgbClr val="7030A0">
-                  <a:shade val="67500"/>
-                  <a:satMod val="115000"/>
-                </a:srgbClr>
-              </a:gs>
-              <a:gs pos="100000">
-                <a:srgbClr val="7030A0">
-                  <a:shade val="100000"/>
-                  <a:satMod val="115000"/>
-                </a:srgbClr>
-              </a:gs>
-            </a:gsLst>
-            <a:lin ang="10800000" scaled="1"/>
-            <a:tileRect/>
-          </a:gradFill>
-          <a:ln>
-            <a:noFill/>
-          </a:ln>
-        </p:spPr>
-        <p:style>
-          <a:lnRef idx="2">
-            <a:schemeClr val="accent1">
-              <a:shade val="15000"/>
-            </a:schemeClr>
-          </a:lnRef>
-          <a:fillRef idx="1">
-            <a:schemeClr val="accent1"/>
-          </a:fillRef>
-          <a:effectRef idx="0">
-            <a:schemeClr val="accent1"/>
-          </a:effectRef>
-          <a:fontRef idx="minor">
-            <a:schemeClr val="lt1"/>
-          </a:fontRef>
-        </p:style>
-        <p:txBody>
-          <a:bodyPr rtlCol="0" anchor="ctr"/>
-          <a:lstStyle/>
-          <a:p>
-            <a:pPr algn="ctr"/>
-            <a:endParaRPr lang="fr-FR">
-              <a:solidFill>
-                <a:schemeClr val="tx1"/>
-              </a:solidFill>
-            </a:endParaRPr>
-          </a:p>
-        </p:txBody>
-      </p:sp>
-      <p:pic>
-        <p:nvPicPr>
-          <p:cNvPr id="3" name="Graphique 2" descr="Livres sur une étagère avec un remplissage uni">
-            <a:extLst>
-              <a:ext uri="{FF2B5EF4-FFF2-40B4-BE49-F238E27FC236}">
-                <a16:creationId xmlns:a16="http://schemas.microsoft.com/office/drawing/2014/main" id="{0E424B50-B67B-2FF8-F245-4331AAD43DE9}"/>
-              </a:ext>
-            </a:extLst>
-          </p:cNvPr>
-          <p:cNvPicPr>
-            <a:picLocks noChangeAspect="1"/>
-          </p:cNvPicPr>
-          <p:nvPr/>
-        </p:nvPicPr>
-        <p:blipFill>
-          <a:blip r:embed="rId3">
-            <a:extLst>
-              <a:ext uri="{96DAC541-7B7A-43D3-8B79-37D633B846F1}">
-                <asvg:svgBlip xmlns:asvg="http://schemas.microsoft.com/office/drawing/2016/SVG/main" r:embed="rId4"/>
-              </a:ext>
-            </a:extLst>
-          </a:blip>
-          <a:stretch>
-            <a:fillRect/>
-          </a:stretch>
-        </p:blipFill>
-        <p:spPr>
-          <a:xfrm rot="10800000">
-            <a:off x="-1074715" y="1632155"/>
-            <a:ext cx="914400" cy="914400"/>
-          </a:xfrm>
-          <a:prstGeom prst="rect">
-            <a:avLst/>
-          </a:prstGeom>
-        </p:spPr>
-      </p:pic>
-      <p:pic>
-        <p:nvPicPr>
-          <p:cNvPr id="5" name="Graphique 4" descr="Informatique hébergé avec un remplissage uni">
-            <a:extLst>
-              <a:ext uri="{FF2B5EF4-FFF2-40B4-BE49-F238E27FC236}">
-                <a16:creationId xmlns:a16="http://schemas.microsoft.com/office/drawing/2014/main" id="{491B6968-6E44-A084-6CDE-942136968EC4}"/>
-              </a:ext>
-            </a:extLst>
-          </p:cNvPr>
-          <p:cNvPicPr>
-            <a:picLocks noChangeAspect="1"/>
-          </p:cNvPicPr>
-          <p:nvPr/>
-        </p:nvPicPr>
-        <p:blipFill>
-          <a:blip r:embed="rId5">
-            <a:extLst>
-              <a:ext uri="{96DAC541-7B7A-43D3-8B79-37D633B846F1}">
-                <asvg:svgBlip xmlns:asvg="http://schemas.microsoft.com/office/drawing/2016/SVG/main" r:embed="rId6"/>
-              </a:ext>
-            </a:extLst>
-          </a:blip>
-          <a:stretch>
-            <a:fillRect/>
-          </a:stretch>
-        </p:blipFill>
-        <p:spPr>
-          <a:xfrm rot="10800000">
-            <a:off x="-1876079" y="2514600"/>
-            <a:ext cx="914400" cy="914400"/>
-          </a:xfrm>
-          <a:prstGeom prst="rect">
-            <a:avLst/>
-          </a:prstGeom>
-        </p:spPr>
-      </p:pic>
-      <p:pic>
-        <p:nvPicPr>
-          <p:cNvPr id="7" name="Graphique 6" descr="Ordinateur avec un remplissage uni">
-            <a:extLst>
-              <a:ext uri="{FF2B5EF4-FFF2-40B4-BE49-F238E27FC236}">
-                <a16:creationId xmlns:a16="http://schemas.microsoft.com/office/drawing/2014/main" id="{7673EC41-6609-FE70-E929-3688216FF592}"/>
-              </a:ext>
-            </a:extLst>
-          </p:cNvPr>
-          <p:cNvPicPr>
-            <a:picLocks noChangeAspect="1"/>
-          </p:cNvPicPr>
-          <p:nvPr/>
-        </p:nvPicPr>
-        <p:blipFill>
-          <a:blip r:embed="rId7">
-            <a:extLst>
-              <a:ext uri="{96DAC541-7B7A-43D3-8B79-37D633B846F1}">
-                <asvg:svgBlip xmlns:asvg="http://schemas.microsoft.com/office/drawing/2016/SVG/main" r:embed="rId8"/>
-              </a:ext>
-            </a:extLst>
-          </a:blip>
-          <a:stretch>
-            <a:fillRect/>
-          </a:stretch>
-        </p:blipFill>
-        <p:spPr>
-          <a:xfrm rot="10800000">
-            <a:off x="-929359" y="4358104"/>
-            <a:ext cx="914400" cy="914400"/>
-          </a:xfrm>
-          <a:prstGeom prst="rect">
-            <a:avLst/>
-          </a:prstGeom>
-        </p:spPr>
-      </p:pic>
-      <p:pic>
-        <p:nvPicPr>
-          <p:cNvPr id="10" name="Graphique 9" descr="Enveloppe avec un remplissage uni">
-            <a:extLst>
-              <a:ext uri="{FF2B5EF4-FFF2-40B4-BE49-F238E27FC236}">
-                <a16:creationId xmlns:a16="http://schemas.microsoft.com/office/drawing/2014/main" id="{2E473E79-324E-DC67-68FA-D9A52D0F78F9}"/>
-              </a:ext>
-            </a:extLst>
-          </p:cNvPr>
-          <p:cNvPicPr>
-            <a:picLocks noChangeAspect="1"/>
-          </p:cNvPicPr>
-          <p:nvPr/>
-        </p:nvPicPr>
-        <p:blipFill>
-          <a:blip r:embed="rId9">
-            <a:extLst>
-              <a:ext uri="{96DAC541-7B7A-43D3-8B79-37D633B846F1}">
-                <asvg:svgBlip xmlns:asvg="http://schemas.microsoft.com/office/drawing/2016/SVG/main" r:embed="rId10"/>
-              </a:ext>
-            </a:extLst>
-          </a:blip>
-          <a:stretch>
-            <a:fillRect/>
-          </a:stretch>
-        </p:blipFill>
-        <p:spPr>
-          <a:xfrm rot="10800000">
-            <a:off x="-1843759" y="3585912"/>
-            <a:ext cx="914400" cy="914400"/>
-          </a:xfrm>
-          <a:prstGeom prst="rect">
-            <a:avLst/>
-          </a:prstGeom>
-        </p:spPr>
-      </p:pic>
-      <p:sp>
-        <p:nvSpPr>
-          <p:cNvPr id="16" name="Arc plein 15">
-            <a:extLst>
-              <a:ext uri="{FF2B5EF4-FFF2-40B4-BE49-F238E27FC236}">
-                <a16:creationId xmlns:a16="http://schemas.microsoft.com/office/drawing/2014/main" id="{02B8F96F-FD51-BE76-6FED-6D5B35B1DB5A}"/>
-              </a:ext>
-            </a:extLst>
-          </p:cNvPr>
-          <p:cNvSpPr/>
-          <p:nvPr/>
-        </p:nvSpPr>
-        <p:spPr>
-          <a:xfrm rot="1324638">
-            <a:off x="-1996633" y="1467091"/>
-            <a:ext cx="3993265" cy="3923818"/>
-          </a:xfrm>
-          <a:prstGeom prst="blockArc">
-            <a:avLst>
-              <a:gd name="adj1" fmla="val 18889740"/>
-              <a:gd name="adj2" fmla="val 0"/>
-              <a:gd name="adj3" fmla="val 25000"/>
-            </a:avLst>
-          </a:prstGeom>
-          <a:solidFill>
-            <a:srgbClr val="FFC000"/>
-          </a:solidFill>
-          <a:ln>
-            <a:noFill/>
-          </a:ln>
-        </p:spPr>
-        <p:style>
-          <a:lnRef idx="2">
-            <a:schemeClr val="accent1">
-              <a:shade val="15000"/>
-            </a:schemeClr>
-          </a:lnRef>
-          <a:fillRef idx="1">
-            <a:schemeClr val="accent1"/>
-          </a:fillRef>
-          <a:effectRef idx="0">
-            <a:schemeClr val="accent1"/>
-          </a:effectRef>
-          <a:fontRef idx="minor">
-            <a:schemeClr val="lt1"/>
-          </a:fontRef>
-        </p:style>
-        <p:txBody>
-          <a:bodyPr rtlCol="0" anchor="ctr"/>
-          <a:lstStyle/>
-          <a:p>
-            <a:pPr algn="ctr"/>
-            <a:endParaRPr lang="fr-FR">
-              <a:solidFill>
-                <a:schemeClr val="tx1"/>
-              </a:solidFill>
-            </a:endParaRPr>
-          </a:p>
-        </p:txBody>
-      </p:sp>
-      <p:pic>
-        <p:nvPicPr>
-          <p:cNvPr id="6" name="Graphique 5" descr="Personne confuse avec un remplissage uni">
-            <a:extLst>
-              <a:ext uri="{FF2B5EF4-FFF2-40B4-BE49-F238E27FC236}">
-                <a16:creationId xmlns:a16="http://schemas.microsoft.com/office/drawing/2014/main" id="{3174C681-7805-4B03-0B99-1357EBA31E4F}"/>
-              </a:ext>
-            </a:extLst>
-          </p:cNvPr>
-          <p:cNvPicPr>
-            <a:picLocks noChangeAspect="1"/>
-          </p:cNvPicPr>
-          <p:nvPr/>
-        </p:nvPicPr>
-        <p:blipFill>
-          <a:blip r:embed="rId11">
-            <a:extLst>
-              <a:ext uri="{96DAC541-7B7A-43D3-8B79-37D633B846F1}">
-                <asvg:svgBlip xmlns:asvg="http://schemas.microsoft.com/office/drawing/2016/SVG/main" r:embed="rId12"/>
-              </a:ext>
-            </a:extLst>
-          </a:blip>
-          <a:stretch>
-            <a:fillRect/>
-          </a:stretch>
-        </p:blipFill>
-        <p:spPr>
-          <a:xfrm>
-            <a:off x="1051367" y="3015205"/>
-            <a:ext cx="914400" cy="914400"/>
-          </a:xfrm>
-          <a:prstGeom prst="rect">
-            <a:avLst/>
-          </a:prstGeom>
-        </p:spPr>
-      </p:pic>
-      <p:sp>
-        <p:nvSpPr>
-          <p:cNvPr id="4" name="Forme libre : forme 3">
-            <a:extLst>
-              <a:ext uri="{FF2B5EF4-FFF2-40B4-BE49-F238E27FC236}">
-                <a16:creationId xmlns:a16="http://schemas.microsoft.com/office/drawing/2014/main" id="{D529A252-D11D-999B-0AD0-D19DEE9C99ED}"/>
-              </a:ext>
-            </a:extLst>
-          </p:cNvPr>
-          <p:cNvSpPr/>
-          <p:nvPr/>
-        </p:nvSpPr>
-        <p:spPr>
-          <a:xfrm>
-            <a:off x="2708187" y="1497035"/>
-            <a:ext cx="9483813" cy="5360965"/>
-          </a:xfrm>
-          <a:custGeom>
-            <a:avLst/>
-            <a:gdLst/>
-            <a:ahLst/>
-            <a:cxnLst/>
-            <a:rect l="l" t="t" r="r" b="b"/>
-            <a:pathLst>
-              <a:path w="12192000" h="6858000">
-                <a:moveTo>
-                  <a:pt x="6619351" y="2948881"/>
-                </a:moveTo>
-                <a:cubicBezTo>
-                  <a:pt x="6697486" y="2982367"/>
-                  <a:pt x="6754785" y="3019946"/>
-                  <a:pt x="6791248" y="3061618"/>
-                </a:cubicBezTo>
-                <a:cubicBezTo>
-                  <a:pt x="6827711" y="3103290"/>
-                  <a:pt x="6845942" y="3151659"/>
-                  <a:pt x="6845942" y="3206726"/>
-                </a:cubicBezTo>
-                <a:cubicBezTo>
-                  <a:pt x="6845942" y="3251374"/>
-                  <a:pt x="6833850" y="3291186"/>
-                  <a:pt x="6809665" y="3326160"/>
-                </a:cubicBezTo>
-                <a:cubicBezTo>
-                  <a:pt x="6785481" y="3361135"/>
-                  <a:pt x="6757761" y="3378622"/>
-                  <a:pt x="6726507" y="3378622"/>
-                </a:cubicBezTo>
-                <a:cubicBezTo>
-                  <a:pt x="6704183" y="3378622"/>
-                  <a:pt x="6679627" y="3374715"/>
-                  <a:pt x="6652838" y="3366902"/>
-                </a:cubicBezTo>
-                <a:cubicBezTo>
-                  <a:pt x="6626048" y="3359088"/>
-                  <a:pt x="6600376" y="3348484"/>
-                  <a:pt x="6575819" y="3335090"/>
-                </a:cubicBezTo>
-                <a:close/>
-                <a:moveTo>
-                  <a:pt x="8774828" y="2877443"/>
-                </a:moveTo>
-                <a:lnTo>
-                  <a:pt x="8929982" y="3322811"/>
-                </a:lnTo>
-                <a:lnTo>
-                  <a:pt x="8624140" y="3426619"/>
-                </a:lnTo>
-                <a:close/>
-                <a:moveTo>
-                  <a:pt x="7020071" y="2569369"/>
-                </a:moveTo>
-                <a:cubicBezTo>
-                  <a:pt x="6983608" y="2569369"/>
-                  <a:pt x="6941936" y="2571043"/>
-                  <a:pt x="6895055" y="2574392"/>
-                </a:cubicBezTo>
-                <a:cubicBezTo>
-                  <a:pt x="6848174" y="2577741"/>
-                  <a:pt x="6791992" y="2583508"/>
-                  <a:pt x="6726507" y="2591693"/>
-                </a:cubicBezTo>
-                <a:lnTo>
-                  <a:pt x="5869257" y="2689920"/>
-                </a:lnTo>
-                <a:lnTo>
-                  <a:pt x="6221980" y="2842841"/>
-                </a:lnTo>
-                <a:lnTo>
-                  <a:pt x="6059013" y="4063975"/>
-                </a:lnTo>
-                <a:lnTo>
-                  <a:pt x="5901627" y="4175596"/>
-                </a:lnTo>
-                <a:lnTo>
-                  <a:pt x="6845942" y="4281636"/>
-                </a:lnTo>
-                <a:lnTo>
-                  <a:pt x="6594795" y="4059511"/>
-                </a:lnTo>
-                <a:lnTo>
-                  <a:pt x="6562424" y="3662139"/>
-                </a:lnTo>
-                <a:cubicBezTo>
-                  <a:pt x="6581772" y="3665860"/>
-                  <a:pt x="6600562" y="3669395"/>
-                  <a:pt x="6618793" y="3672743"/>
-                </a:cubicBezTo>
-                <a:cubicBezTo>
-                  <a:pt x="6637025" y="3676092"/>
-                  <a:pt x="6654698" y="3678511"/>
-                  <a:pt x="6671813" y="3679999"/>
-                </a:cubicBezTo>
-                <a:lnTo>
-                  <a:pt x="7094857" y="4194572"/>
-                </a:lnTo>
-                <a:lnTo>
-                  <a:pt x="7005560" y="4363120"/>
-                </a:lnTo>
-                <a:lnTo>
-                  <a:pt x="7753421" y="4111972"/>
-                </a:lnTo>
-                <a:lnTo>
-                  <a:pt x="7116065" y="3677766"/>
-                </a:lnTo>
-                <a:cubicBezTo>
-                  <a:pt x="7312518" y="3642048"/>
-                  <a:pt x="7460602" y="3577121"/>
-                  <a:pt x="7560317" y="3482988"/>
-                </a:cubicBezTo>
-                <a:cubicBezTo>
-                  <a:pt x="7660032" y="3388854"/>
-                  <a:pt x="7709889" y="3267001"/>
-                  <a:pt x="7709889" y="3117429"/>
-                </a:cubicBezTo>
-                <a:cubicBezTo>
-                  <a:pt x="7709889" y="2937346"/>
-                  <a:pt x="7651474" y="2800983"/>
-                  <a:pt x="7534644" y="2708337"/>
-                </a:cubicBezTo>
-                <a:cubicBezTo>
-                  <a:pt x="7417814" y="2615692"/>
-                  <a:pt x="7246289" y="2569369"/>
-                  <a:pt x="7020071" y="2569369"/>
-                </a:cubicBezTo>
-                <a:close/>
-                <a:moveTo>
-                  <a:pt x="8074964" y="2548161"/>
-                </a:moveTo>
-                <a:lnTo>
-                  <a:pt x="8269185" y="2674293"/>
-                </a:lnTo>
-                <a:lnTo>
-                  <a:pt x="7926508" y="4007049"/>
-                </a:lnTo>
-                <a:lnTo>
-                  <a:pt x="7668664" y="4199037"/>
-                </a:lnTo>
-                <a:lnTo>
-                  <a:pt x="8726832" y="4123135"/>
-                </a:lnTo>
-                <a:lnTo>
-                  <a:pt x="8569446" y="4000351"/>
-                </a:lnTo>
-                <a:lnTo>
-                  <a:pt x="8674370" y="3712369"/>
-                </a:lnTo>
-                <a:lnTo>
-                  <a:pt x="9036022" y="3684464"/>
-                </a:lnTo>
-                <a:lnTo>
-                  <a:pt x="9106343" y="3931146"/>
-                </a:lnTo>
-                <a:lnTo>
-                  <a:pt x="8857428" y="4264893"/>
-                </a:lnTo>
-                <a:lnTo>
-                  <a:pt x="9830764" y="3963516"/>
-                </a:lnTo>
-                <a:lnTo>
-                  <a:pt x="9618684" y="3899892"/>
-                </a:lnTo>
-                <a:lnTo>
-                  <a:pt x="9081786" y="2701082"/>
-                </a:lnTo>
-                <a:lnTo>
-                  <a:pt x="9387628" y="2591693"/>
-                </a:lnTo>
-                <a:close/>
-                <a:moveTo>
-                  <a:pt x="3932036" y="2539231"/>
-                </a:moveTo>
-                <a:lnTo>
-                  <a:pt x="2235396" y="2698849"/>
-                </a:lnTo>
-                <a:lnTo>
-                  <a:pt x="2624953" y="2884140"/>
-                </a:lnTo>
-                <a:lnTo>
-                  <a:pt x="2487660" y="4002584"/>
-                </a:lnTo>
-                <a:lnTo>
-                  <a:pt x="2235396" y="4168899"/>
-                </a:lnTo>
-                <a:lnTo>
-                  <a:pt x="3563686" y="4262661"/>
-                </a:lnTo>
-                <a:lnTo>
-                  <a:pt x="3338212" y="4114205"/>
-                </a:lnTo>
-                <a:lnTo>
-                  <a:pt x="3212081" y="3620840"/>
-                </a:lnTo>
-                <a:lnTo>
-                  <a:pt x="3611684" y="3643164"/>
-                </a:lnTo>
-                <a:lnTo>
-                  <a:pt x="3849437" y="3972446"/>
-                </a:lnTo>
-                <a:lnTo>
-                  <a:pt x="3637357" y="3037061"/>
-                </a:lnTo>
-                <a:lnTo>
-                  <a:pt x="3517922" y="3204493"/>
-                </a:lnTo>
-                <a:lnTo>
-                  <a:pt x="3234404" y="3326160"/>
-                </a:lnTo>
-                <a:lnTo>
-                  <a:pt x="3155153" y="2960043"/>
-                </a:lnTo>
-                <a:lnTo>
-                  <a:pt x="3818183" y="2914278"/>
-                </a:lnTo>
-                <a:lnTo>
-                  <a:pt x="4073795" y="3350717"/>
-                </a:lnTo>
-                <a:lnTo>
-                  <a:pt x="3956165" y="2677353"/>
-                </a:lnTo>
-                <a:lnTo>
-                  <a:pt x="4225079" y="2781449"/>
-                </a:lnTo>
-                <a:lnTo>
-                  <a:pt x="4396976" y="4007049"/>
-                </a:lnTo>
-                <a:lnTo>
-                  <a:pt x="3913656" y="4175596"/>
-                </a:lnTo>
-                <a:lnTo>
-                  <a:pt x="5752055" y="4255964"/>
-                </a:lnTo>
-                <a:lnTo>
-                  <a:pt x="5852514" y="3518148"/>
-                </a:lnTo>
-                <a:lnTo>
-                  <a:pt x="5555602" y="3922217"/>
-                </a:lnTo>
-                <a:lnTo>
-                  <a:pt x="4914897" y="3841849"/>
-                </a:lnTo>
-                <a:lnTo>
-                  <a:pt x="5049959" y="3479081"/>
-                </a:lnTo>
-                <a:lnTo>
-                  <a:pt x="5390403" y="3524846"/>
-                </a:lnTo>
-                <a:lnTo>
-                  <a:pt x="5512070" y="3716834"/>
-                </a:lnTo>
-                <a:lnTo>
-                  <a:pt x="5468538" y="2944416"/>
-                </a:lnTo>
-                <a:lnTo>
-                  <a:pt x="5354684" y="3119661"/>
-                </a:lnTo>
-                <a:lnTo>
-                  <a:pt x="4970708" y="3208958"/>
-                </a:lnTo>
-                <a:lnTo>
-                  <a:pt x="5052192" y="2868514"/>
-                </a:lnTo>
-                <a:lnTo>
-                  <a:pt x="5590205" y="2866281"/>
-                </a:lnTo>
-                <a:lnTo>
-                  <a:pt x="5772147" y="3053805"/>
-                </a:lnTo>
-                <a:lnTo>
-                  <a:pt x="5662758" y="2541464"/>
-                </a:lnTo>
-                <a:lnTo>
-                  <a:pt x="3952823" y="2658224"/>
-                </a:lnTo>
-                <a:close/>
-                <a:moveTo>
-                  <a:pt x="0" y="0"/>
-                </a:moveTo>
-                <a:lnTo>
-                  <a:pt x="12192000" y="0"/>
-                </a:lnTo>
-                <a:lnTo>
-                  <a:pt x="12192000" y="6858000"/>
-                </a:lnTo>
-                <a:lnTo>
-                  <a:pt x="0" y="6858000"/>
-                </a:lnTo>
-                <a:close/>
-              </a:path>
-            </a:pathLst>
-          </a:custGeom>
           <a:gradFill flip="none" rotWithShape="1">
             <a:gsLst>
               <a:gs pos="0">
@@ -18359,6 +20595,103 @@
           </a:fontRef>
         </p:style>
       </p:cxnSp>
+      <p:pic>
+        <p:nvPicPr>
+          <p:cNvPr id="12" name="Image 11">
+            <a:extLst>
+              <a:ext uri="{FF2B5EF4-FFF2-40B4-BE49-F238E27FC236}">
+                <a16:creationId xmlns:a16="http://schemas.microsoft.com/office/drawing/2014/main" id="{52170D7D-4350-86CF-2413-2B377D08A070}"/>
+              </a:ext>
+            </a:extLst>
+          </p:cNvPr>
+          <p:cNvPicPr>
+            <a:picLocks noChangeAspect="1"/>
+          </p:cNvPicPr>
+          <p:nvPr/>
+        </p:nvPicPr>
+        <p:blipFill>
+          <a:blip r:embed="rId13"/>
+          <a:stretch>
+            <a:fillRect/>
+          </a:stretch>
+        </p:blipFill>
+        <p:spPr>
+          <a:xfrm>
+            <a:off x="3864602" y="8962412"/>
+            <a:ext cx="4462796" cy="1259304"/>
+          </a:xfrm>
+          <a:prstGeom prst="rect">
+            <a:avLst/>
+          </a:prstGeom>
+        </p:spPr>
+      </p:pic>
+      <p:pic>
+        <p:nvPicPr>
+          <p:cNvPr id="19" name="Image 18">
+            <a:extLst>
+              <a:ext uri="{FF2B5EF4-FFF2-40B4-BE49-F238E27FC236}">
+                <a16:creationId xmlns:a16="http://schemas.microsoft.com/office/drawing/2014/main" id="{A9212635-C1B3-E5F9-B2F7-2D1E993E2117}"/>
+              </a:ext>
+            </a:extLst>
+          </p:cNvPr>
+          <p:cNvPicPr>
+            <a:picLocks noChangeAspect="1"/>
+          </p:cNvPicPr>
+          <p:nvPr/>
+        </p:nvPicPr>
+        <p:blipFill>
+          <a:blip r:embed="rId14"/>
+          <a:stretch>
+            <a:fillRect/>
+          </a:stretch>
+        </p:blipFill>
+        <p:spPr>
+          <a:xfrm>
+            <a:off x="3864602" y="6858000"/>
+            <a:ext cx="4462796" cy="2113956"/>
+          </a:xfrm>
+          <a:prstGeom prst="rect">
+            <a:avLst/>
+          </a:prstGeom>
+        </p:spPr>
+      </p:pic>
+      <p:sp>
+        <p:nvSpPr>
+          <p:cNvPr id="20" name="ZoneTexte 19">
+            <a:extLst>
+              <a:ext uri="{FF2B5EF4-FFF2-40B4-BE49-F238E27FC236}">
+                <a16:creationId xmlns:a16="http://schemas.microsoft.com/office/drawing/2014/main" id="{95BF97AC-AB1E-6553-24E4-0D1CF2C4D109}"/>
+              </a:ext>
+            </a:extLst>
+          </p:cNvPr>
+          <p:cNvSpPr txBox="1"/>
+          <p:nvPr/>
+        </p:nvSpPr>
+        <p:spPr>
+          <a:xfrm>
+            <a:off x="3031507" y="6902155"/>
+            <a:ext cx="6300123" cy="769441"/>
+          </a:xfrm>
+          <a:prstGeom prst="rect">
+            <a:avLst/>
+          </a:prstGeom>
+          <a:noFill/>
+        </p:spPr>
+        <p:txBody>
+          <a:bodyPr wrap="none" rtlCol="0">
+            <a:spAutoFit/>
+          </a:bodyPr>
+          <a:lstStyle/>
+          <a:p>
+            <a:r>
+              <a:rPr lang="fr-FR" sz="4400" dirty="0">
+                <a:latin typeface="Algerian" panose="04020705040A02060702" pitchFamily="82" charset="0"/>
+              </a:rPr>
+              <a:t>Les différents rôles</a:t>
+            </a:r>
+          </a:p>
+        </p:txBody>
+      </p:sp>
     </p:spTree>
     <p:extLst>
       <p:ext uri="{BB962C8B-B14F-4D97-AF65-F5344CB8AC3E}">
@@ -19950,13 +22283,13 @@
   <p:clrMapOvr>
     <a:masterClrMapping/>
   </p:clrMapOvr>
-  <mc:AlternateContent xmlns:mc="http://schemas.openxmlformats.org/markup-compatibility/2006">
-    <mc:Choice xmlns:p159="http://schemas.microsoft.com/office/powerpoint/2015/09/main" Requires="p159">
+  <mc:AlternateContent xmlns:mc="http://schemas.openxmlformats.org/markup-compatibility/2006" xmlns:p159="http://schemas.microsoft.com/office/powerpoint/2015/09/main">
+    <mc:Choice Requires="p159">
       <p:transition xmlns:p14="http://schemas.microsoft.com/office/powerpoint/2010/main" spd="slow" p14:dur="2000">
         <p159:morph option="byObject"/>
       </p:transition>
     </mc:Choice>
-    <mc:Fallback>
+    <mc:Fallback xmlns="">
       <p:transition spd="slow">
         <p:fade/>
       </p:transition>
@@ -20845,13 +23178,13 @@
   <p:clrMapOvr>
     <a:masterClrMapping/>
   </p:clrMapOvr>
-  <mc:AlternateContent xmlns:mc="http://schemas.openxmlformats.org/markup-compatibility/2006">
-    <mc:Choice xmlns:p159="http://schemas.microsoft.com/office/powerpoint/2015/09/main" Requires="p159">
+  <mc:AlternateContent xmlns:mc="http://schemas.openxmlformats.org/markup-compatibility/2006" xmlns:p159="http://schemas.microsoft.com/office/powerpoint/2015/09/main">
+    <mc:Choice Requires="p159">
       <p:transition xmlns:p14="http://schemas.microsoft.com/office/powerpoint/2010/main" spd="slow" p14:dur="2000">
         <p159:morph option="byObject"/>
       </p:transition>
     </mc:Choice>
-    <mc:Fallback>
+    <mc:Fallback xmlns="">
       <p:transition spd="slow">
         <p:fade/>
       </p:transition>
@@ -21740,13 +24073,13 @@
   <p:clrMapOvr>
     <a:masterClrMapping/>
   </p:clrMapOvr>
-  <mc:AlternateContent xmlns:mc="http://schemas.openxmlformats.org/markup-compatibility/2006">
-    <mc:Choice xmlns:p159="http://schemas.microsoft.com/office/powerpoint/2015/09/main" Requires="p159">
+  <mc:AlternateContent xmlns:mc="http://schemas.openxmlformats.org/markup-compatibility/2006" xmlns:p159="http://schemas.microsoft.com/office/powerpoint/2015/09/main">
+    <mc:Choice Requires="p159">
       <p:transition xmlns:p14="http://schemas.microsoft.com/office/powerpoint/2010/main" spd="slow" p14:dur="2000">
         <p159:morph option="byObject"/>
       </p:transition>
     </mc:Choice>
-    <mc:Fallback>
+    <mc:Fallback xmlns="">
       <p:transition spd="slow">
         <p:fade/>
       </p:transition>
@@ -22672,13 +25005,13 @@
   <p:clrMapOvr>
     <a:masterClrMapping/>
   </p:clrMapOvr>
-  <mc:AlternateContent xmlns:mc="http://schemas.openxmlformats.org/markup-compatibility/2006">
-    <mc:Choice xmlns:p159="http://schemas.microsoft.com/office/powerpoint/2015/09/main" Requires="p159">
+  <mc:AlternateContent xmlns:mc="http://schemas.openxmlformats.org/markup-compatibility/2006" xmlns:p159="http://schemas.microsoft.com/office/powerpoint/2015/09/main">
+    <mc:Choice Requires="p159">
       <p:transition xmlns:p14="http://schemas.microsoft.com/office/powerpoint/2010/main" spd="slow" p14:dur="2000">
         <p159:morph option="byObject"/>
       </p:transition>
     </mc:Choice>
-    <mc:Fallback>
+    <mc:Fallback xmlns="">
       <p:transition spd="slow">
         <p:fade/>
       </p:transition>
@@ -23733,13 +26066,13 @@
   <p:clrMapOvr>
     <a:masterClrMapping/>
   </p:clrMapOvr>
-  <mc:AlternateContent xmlns:mc="http://schemas.openxmlformats.org/markup-compatibility/2006">
-    <mc:Choice xmlns:p159="http://schemas.microsoft.com/office/powerpoint/2015/09/main" Requires="p159">
+  <mc:AlternateContent xmlns:mc="http://schemas.openxmlformats.org/markup-compatibility/2006" xmlns:p159="http://schemas.microsoft.com/office/powerpoint/2015/09/main">
+    <mc:Choice Requires="p159">
       <p:transition xmlns:p14="http://schemas.microsoft.com/office/powerpoint/2010/main" spd="slow" p14:dur="2000">
         <p159:morph option="byObject"/>
       </p:transition>
     </mc:Choice>
-    <mc:Fallback>
+    <mc:Fallback xmlns="">
       <p:transition spd="slow">
         <p:fade/>
       </p:transition>

</xml_diff>